<commit_message>
Avances en los documentos
</commit_message>
<xml_diff>
--- a/poster/Poster.pptx
+++ b/poster/Poster.pptx
@@ -261,7 +261,7 @@
             <a:fld id="{0158C5BC-9A70-462C-B28D-9600239EAC64}" type="datetimeFigureOut">
               <a:rPr lang="en-US" smtClean="0"/>
               <a:pPr/>
-              <a:t>11/24/2017</a:t>
+              <a:t>11/29/2017</a:t>
             </a:fld>
             <a:endParaRPr lang="en-US"/>
           </a:p>
@@ -428,7 +428,7 @@
             <a:fld id="{E6CC2317-6751-4CD4-9995-8782DD78E936}" type="datetimeFigureOut">
               <a:rPr lang="en-US" smtClean="0"/>
               <a:pPr/>
-              <a:t>11/24/2017</a:t>
+              <a:t>11/29/2017</a:t>
             </a:fld>
             <a:endParaRPr lang="en-US" dirty="0"/>
           </a:p>
@@ -1603,7 +1603,7 @@
           <a:p>
             <a:fld id="{48A87A34-81AB-432B-8DAE-1953F412C126}" type="datetimeFigureOut">
               <a:rPr lang="en-US" smtClean="0"/>
-              <a:t>11/24/2017</a:t>
+              <a:t>11/29/2017</a:t>
             </a:fld>
             <a:endParaRPr lang="en-US" dirty="0"/>
           </a:p>
@@ -1916,7 +1916,7 @@
           <a:p>
             <a:fld id="{48A87A34-81AB-432B-8DAE-1953F412C126}" type="datetimeFigureOut">
               <a:rPr lang="en-US" smtClean="0"/>
-              <a:t>11/24/2017</a:t>
+              <a:t>11/29/2017</a:t>
             </a:fld>
             <a:endParaRPr lang="en-US" dirty="0"/>
           </a:p>
@@ -2205,7 +2205,7 @@
           <a:p>
             <a:fld id="{48A87A34-81AB-432B-8DAE-1953F412C126}" type="datetimeFigureOut">
               <a:rPr lang="en-US" smtClean="0"/>
-              <a:t>11/24/2017</a:t>
+              <a:t>11/29/2017</a:t>
             </a:fld>
             <a:endParaRPr lang="en-US" dirty="0"/>
           </a:p>
@@ -2405,7 +2405,7 @@
           <a:p>
             <a:fld id="{48A87A34-81AB-432B-8DAE-1953F412C126}" type="datetimeFigureOut">
               <a:rPr lang="en-US" smtClean="0"/>
-              <a:t>11/24/2017</a:t>
+              <a:t>11/29/2017</a:t>
             </a:fld>
             <a:endParaRPr lang="en-US" dirty="0"/>
           </a:p>
@@ -2615,7 +2615,7 @@
           <a:p>
             <a:fld id="{48A87A34-81AB-432B-8DAE-1953F412C126}" type="datetimeFigureOut">
               <a:rPr lang="en-US" smtClean="0"/>
-              <a:t>11/24/2017</a:t>
+              <a:t>11/29/2017</a:t>
             </a:fld>
             <a:endParaRPr lang="en-US" dirty="0"/>
           </a:p>
@@ -5403,7 +5403,7 @@
           <a:p>
             <a:fld id="{48A87A34-81AB-432B-8DAE-1953F412C126}" type="datetimeFigureOut">
               <a:rPr lang="en-US" smtClean="0"/>
-              <a:t>11/24/2017</a:t>
+              <a:t>11/29/2017</a:t>
             </a:fld>
             <a:endParaRPr lang="en-US" dirty="0"/>
           </a:p>
@@ -5603,7 +5603,7 @@
           <a:p>
             <a:fld id="{48A87A34-81AB-432B-8DAE-1953F412C126}" type="datetimeFigureOut">
               <a:rPr lang="en-US" smtClean="0"/>
-              <a:t>11/24/2017</a:t>
+              <a:t>11/29/2017</a:t>
             </a:fld>
             <a:endParaRPr lang="en-US" dirty="0"/>
           </a:p>
@@ -5879,7 +5879,7 @@
           <a:p>
             <a:fld id="{48A87A34-81AB-432B-8DAE-1953F412C126}" type="datetimeFigureOut">
               <a:rPr lang="en-US" smtClean="0"/>
-              <a:t>11/24/2017</a:t>
+              <a:t>11/29/2017</a:t>
             </a:fld>
             <a:endParaRPr lang="en-US" dirty="0"/>
           </a:p>
@@ -6147,7 +6147,7 @@
           <a:p>
             <a:fld id="{48A87A34-81AB-432B-8DAE-1953F412C126}" type="datetimeFigureOut">
               <a:rPr lang="en-US" smtClean="0"/>
-              <a:t>11/24/2017</a:t>
+              <a:t>11/29/2017</a:t>
             </a:fld>
             <a:endParaRPr lang="en-US" dirty="0"/>
           </a:p>
@@ -6562,7 +6562,7 @@
           <a:p>
             <a:fld id="{48A87A34-81AB-432B-8DAE-1953F412C126}" type="datetimeFigureOut">
               <a:rPr lang="en-US" smtClean="0"/>
-              <a:t>11/24/2017</a:t>
+              <a:t>11/29/2017</a:t>
             </a:fld>
             <a:endParaRPr lang="en-US" dirty="0"/>
           </a:p>
@@ -6704,7 +6704,7 @@
           <a:p>
             <a:fld id="{48A87A34-81AB-432B-8DAE-1953F412C126}" type="datetimeFigureOut">
               <a:rPr lang="en-US" smtClean="0"/>
-              <a:t>11/24/2017</a:t>
+              <a:t>11/29/2017</a:t>
             </a:fld>
             <a:endParaRPr lang="en-US" dirty="0"/>
           </a:p>
@@ -7957,7 +7957,7 @@
               <a:graphicData uri="http://schemas.openxmlformats.org/presentationml/2006/ole">
                 <mc:AlternateContent xmlns:mc="http://schemas.openxmlformats.org/markup-compatibility/2006">
                   <mc:Choice xmlns:v="urn:schemas-microsoft-com:vml" Requires="v">
-                    <p:oleObj spid="_x0000_s1158" name="Image" r:id="rId8" imgW="1828440" imgH="1117440" progId="Photoshop.Image.13">
+                    <p:oleObj spid="_x0000_s1170" name="Image" r:id="rId8" imgW="1828440" imgH="1117440" progId="Photoshop.Image.13">
                       <p:embed/>
                     </p:oleObj>
                   </mc:Choice>
@@ -8014,7 +8014,7 @@
               <a:graphicData uri="http://schemas.openxmlformats.org/presentationml/2006/ole">
                 <mc:AlternateContent xmlns:mc="http://schemas.openxmlformats.org/markup-compatibility/2006">
                   <mc:Choice xmlns:v="urn:schemas-microsoft-com:vml" Requires="v">
-                    <p:oleObj spid="_x0000_s1159" name="Image" r:id="rId10" imgW="1828440" imgH="1117440" progId="Photoshop.Image.13">
+                    <p:oleObj spid="_x0000_s1171" name="Image" r:id="rId10" imgW="1828440" imgH="1117440" progId="Photoshop.Image.13">
                       <p:embed/>
                     </p:oleObj>
                   </mc:Choice>
@@ -9149,7 +9149,7 @@
             <a:graphicData uri="http://schemas.openxmlformats.org/presentationml/2006/ole">
               <mc:AlternateContent xmlns:mc="http://schemas.openxmlformats.org/markup-compatibility/2006">
                 <mc:Choice xmlns:v="urn:schemas-microsoft-com:vml" Requires="v">
-                  <p:oleObj spid="_x0000_s1160" name="Image" r:id="rId12" imgW="4571280" imgH="1688760" progId="Photoshop.Image.13">
+                  <p:oleObj spid="_x0000_s1172" name="Image" r:id="rId12" imgW="4571280" imgH="1688760" progId="Photoshop.Image.13">
                     <p:embed/>
                   </p:oleObj>
                 </mc:Choice>
@@ -9233,7 +9233,7 @@
             <a:graphicData uri="http://schemas.openxmlformats.org/presentationml/2006/ole">
               <mc:AlternateContent xmlns:mc="http://schemas.openxmlformats.org/markup-compatibility/2006">
                 <mc:Choice xmlns:v="urn:schemas-microsoft-com:vml" Requires="v">
-                  <p:oleObj spid="_x0000_s1161" name="Image" r:id="rId15" imgW="1574280" imgH="1053720" progId="Photoshop.Image.13">
+                  <p:oleObj spid="_x0000_s1173" name="Image" r:id="rId15" imgW="1574280" imgH="1053720" progId="Photoshop.Image.13">
                     <p:embed/>
                   </p:oleObj>
                 </mc:Choice>
@@ -11322,7 +11322,7 @@
               <a:graphicData uri="http://schemas.openxmlformats.org/presentationml/2006/ole">
                 <mc:AlternateContent xmlns:mc="http://schemas.openxmlformats.org/markup-compatibility/2006">
                   <mc:Choice xmlns:v="urn:schemas-microsoft-com:vml" Requires="v">
-                    <p:oleObj spid="_x0000_s2182" name="Image" r:id="rId9" imgW="1828440" imgH="1117440" progId="Photoshop.Image.13">
+                    <p:oleObj spid="_x0000_s2194" name="Image" r:id="rId9" imgW="1828440" imgH="1117440" progId="Photoshop.Image.13">
                       <p:embed/>
                     </p:oleObj>
                   </mc:Choice>
@@ -11379,7 +11379,7 @@
               <a:graphicData uri="http://schemas.openxmlformats.org/presentationml/2006/ole">
                 <mc:AlternateContent xmlns:mc="http://schemas.openxmlformats.org/markup-compatibility/2006">
                   <mc:Choice xmlns:v="urn:schemas-microsoft-com:vml" Requires="v">
-                    <p:oleObj spid="_x0000_s2183" name="Image" r:id="rId11" imgW="1828440" imgH="1117440" progId="Photoshop.Image.13">
+                    <p:oleObj spid="_x0000_s2195" name="Image" r:id="rId11" imgW="1828440" imgH="1117440" progId="Photoshop.Image.13">
                       <p:embed/>
                     </p:oleObj>
                   </mc:Choice>
@@ -12514,7 +12514,7 @@
             <a:graphicData uri="http://schemas.openxmlformats.org/presentationml/2006/ole">
               <mc:AlternateContent xmlns:mc="http://schemas.openxmlformats.org/markup-compatibility/2006">
                 <mc:Choice xmlns:v="urn:schemas-microsoft-com:vml" Requires="v">
-                  <p:oleObj spid="_x0000_s2184" name="Image" r:id="rId13" imgW="4571280" imgH="1688760" progId="Photoshop.Image.13">
+                  <p:oleObj spid="_x0000_s2196" name="Image" r:id="rId13" imgW="4571280" imgH="1688760" progId="Photoshop.Image.13">
                     <p:embed/>
                   </p:oleObj>
                 </mc:Choice>
@@ -12598,7 +12598,7 @@
             <a:graphicData uri="http://schemas.openxmlformats.org/presentationml/2006/ole">
               <mc:AlternateContent xmlns:mc="http://schemas.openxmlformats.org/markup-compatibility/2006">
                 <mc:Choice xmlns:v="urn:schemas-microsoft-com:vml" Requires="v">
-                  <p:oleObj spid="_x0000_s2185" name="Image" r:id="rId16" imgW="1574280" imgH="1053720" progId="Photoshop.Image.13">
+                  <p:oleObj spid="_x0000_s2197" name="Image" r:id="rId16" imgW="1574280" imgH="1053720" progId="Photoshop.Image.13">
                     <p:embed/>
                   </p:oleObj>
                 </mc:Choice>
@@ -13619,7 +13619,7 @@
           <a:p>
             <a:fld id="{2FC08A6D-D247-4F0A-9D2A-84789A2FBCB0}" type="datetimeFigureOut">
               <a:rPr lang="es-CO" smtClean="0"/>
-              <a:t>24/11/2017</a:t>
+              <a:t>29/11/2017</a:t>
             </a:fld>
             <a:endParaRPr lang="es-CO"/>
           </a:p>
@@ -14949,7 +14949,7 @@
               <a:graphicData uri="http://schemas.openxmlformats.org/presentationml/2006/ole">
                 <mc:AlternateContent xmlns:mc="http://schemas.openxmlformats.org/markup-compatibility/2006">
                   <mc:Choice xmlns:v="urn:schemas-microsoft-com:vml" Requires="v">
-                    <p:oleObj spid="_x0000_s6146" name="Image" r:id="rId19" imgW="1828440" imgH="1117440" progId="Photoshop.Image.13">
+                    <p:oleObj spid="_x0000_s6158" name="Image" r:id="rId19" imgW="1828440" imgH="1117440" progId="Photoshop.Image.13">
                       <p:embed/>
                     </p:oleObj>
                   </mc:Choice>
@@ -15018,7 +15018,7 @@
               <a:graphicData uri="http://schemas.openxmlformats.org/presentationml/2006/ole">
                 <mc:AlternateContent xmlns:mc="http://schemas.openxmlformats.org/markup-compatibility/2006">
                   <mc:Choice xmlns:v="urn:schemas-microsoft-com:vml" Requires="v">
-                    <p:oleObj spid="_x0000_s6147" name="Image" r:id="rId21" imgW="1828440" imgH="1117440" progId="Photoshop.Image.13">
+                    <p:oleObj spid="_x0000_s6159" name="Image" r:id="rId21" imgW="1828440" imgH="1117440" progId="Photoshop.Image.13">
                       <p:embed/>
                     </p:oleObj>
                   </mc:Choice>
@@ -16189,7 +16189,7 @@
             <a:graphicData uri="http://schemas.openxmlformats.org/presentationml/2006/ole">
               <mc:AlternateContent xmlns:mc="http://schemas.openxmlformats.org/markup-compatibility/2006">
                 <mc:Choice xmlns:v="urn:schemas-microsoft-com:vml" Requires="v">
-                  <p:oleObj spid="_x0000_s6148" name="Image" r:id="rId23" imgW="4571280" imgH="1688760" progId="Photoshop.Image.13">
+                  <p:oleObj spid="_x0000_s6160" name="Image" r:id="rId23" imgW="4571280" imgH="1688760" progId="Photoshop.Image.13">
                     <p:embed/>
                   </p:oleObj>
                 </mc:Choice>
@@ -16291,7 +16291,7 @@
             <a:graphicData uri="http://schemas.openxmlformats.org/presentationml/2006/ole">
               <mc:AlternateContent xmlns:mc="http://schemas.openxmlformats.org/markup-compatibility/2006">
                 <mc:Choice xmlns:v="urn:schemas-microsoft-com:vml" Requires="v">
-                  <p:oleObj spid="_x0000_s6149" name="Image" r:id="rId26" imgW="1574280" imgH="1053720" progId="Photoshop.Image.13">
+                  <p:oleObj spid="_x0000_s6161" name="Image" r:id="rId26" imgW="1574280" imgH="1053720" progId="Photoshop.Image.13">
                     <p:embed/>
                   </p:oleObj>
                 </mc:Choice>
@@ -16941,6 +16941,246 @@
           </a:p>
         </p:txBody>
       </p:sp>
+      <p:pic>
+        <p:nvPicPr>
+          <p:cNvPr id="6146" name="Picture 2">
+            <a:extLst>
+              <a:ext uri="{FF2B5EF4-FFF2-40B4-BE49-F238E27FC236}">
+                <a16:creationId xmlns:a16="http://schemas.microsoft.com/office/drawing/2014/main" id="{C069D87F-6E35-403B-AA8F-E85004A0110C}"/>
+              </a:ext>
+            </a:extLst>
+          </p:cNvPr>
+          <p:cNvPicPr>
+            <a:picLocks noChangeAspect="1" noChangeArrowheads="1"/>
+          </p:cNvPicPr>
+          <p:nvPr/>
+        </p:nvPicPr>
+        <p:blipFill>
+          <a:blip r:embed="rId30">
+            <a:extLst>
+              <a:ext uri="{28A0092B-C50C-407E-A947-70E740481C1C}">
+                <a14:useLocalDpi xmlns:a14="http://schemas.microsoft.com/office/drawing/2010/main" val="0"/>
+              </a:ext>
+            </a:extLst>
+          </a:blip>
+          <a:srcRect/>
+          <a:stretch>
+            <a:fillRect/>
+          </a:stretch>
+        </p:blipFill>
+        <p:spPr bwMode="auto">
+          <a:xfrm>
+            <a:off x="-10160000" y="34544000"/>
+            <a:ext cx="3962400" cy="2425700"/>
+          </a:xfrm>
+          <a:prstGeom prst="rect">
+            <a:avLst/>
+          </a:prstGeom>
+          <a:noFill/>
+          <a:ln>
+            <a:noFill/>
+          </a:ln>
+          <a:extLst>
+            <a:ext uri="{909E8E84-426E-40DD-AFC4-6F175D3DCCD1}">
+              <a14:hiddenFill xmlns:a14="http://schemas.microsoft.com/office/drawing/2010/main">
+                <a:solidFill>
+                  <a:srgbClr val="FFFFFF"/>
+                </a:solidFill>
+              </a14:hiddenFill>
+            </a:ext>
+            <a:ext uri="{91240B29-F687-4F45-9708-019B960494DF}">
+              <a14:hiddenLine xmlns:a14="http://schemas.microsoft.com/office/drawing/2010/main" w="9525">
+                <a:solidFill>
+                  <a:srgbClr val="000000"/>
+                </a:solidFill>
+                <a:miter lim="800000"/>
+                <a:headEnd/>
+                <a:tailEnd/>
+              </a14:hiddenLine>
+            </a:ext>
+          </a:extLst>
+        </p:spPr>
+      </p:pic>
+      <p:pic>
+        <p:nvPicPr>
+          <p:cNvPr id="6147" name="Picture 3">
+            <a:extLst>
+              <a:ext uri="{FF2B5EF4-FFF2-40B4-BE49-F238E27FC236}">
+                <a16:creationId xmlns:a16="http://schemas.microsoft.com/office/drawing/2014/main" id="{996977F4-85B8-452E-9C11-248CB19F5658}"/>
+              </a:ext>
+            </a:extLst>
+          </p:cNvPr>
+          <p:cNvPicPr>
+            <a:picLocks noChangeAspect="1" noChangeArrowheads="1"/>
+          </p:cNvPicPr>
+          <p:nvPr/>
+        </p:nvPicPr>
+        <p:blipFill>
+          <a:blip r:embed="rId31">
+            <a:extLst>
+              <a:ext uri="{28A0092B-C50C-407E-A947-70E740481C1C}">
+                <a14:useLocalDpi xmlns:a14="http://schemas.microsoft.com/office/drawing/2010/main" val="0"/>
+              </a:ext>
+            </a:extLst>
+          </a:blip>
+          <a:srcRect/>
+          <a:stretch>
+            <a:fillRect/>
+          </a:stretch>
+        </p:blipFill>
+        <p:spPr bwMode="auto">
+          <a:xfrm>
+            <a:off x="-5651500" y="34556700"/>
+            <a:ext cx="3962400" cy="2425700"/>
+          </a:xfrm>
+          <a:prstGeom prst="rect">
+            <a:avLst/>
+          </a:prstGeom>
+          <a:noFill/>
+          <a:ln>
+            <a:noFill/>
+          </a:ln>
+          <a:extLst>
+            <a:ext uri="{909E8E84-426E-40DD-AFC4-6F175D3DCCD1}">
+              <a14:hiddenFill xmlns:a14="http://schemas.microsoft.com/office/drawing/2010/main">
+                <a:solidFill>
+                  <a:srgbClr val="FFFFFF"/>
+                </a:solidFill>
+              </a14:hiddenFill>
+            </a:ext>
+            <a:ext uri="{91240B29-F687-4F45-9708-019B960494DF}">
+              <a14:hiddenLine xmlns:a14="http://schemas.microsoft.com/office/drawing/2010/main" w="9525">
+                <a:solidFill>
+                  <a:srgbClr val="000000"/>
+                </a:solidFill>
+                <a:miter lim="800000"/>
+                <a:headEnd/>
+                <a:tailEnd/>
+              </a14:hiddenLine>
+            </a:ext>
+          </a:extLst>
+        </p:spPr>
+      </p:pic>
+      <p:pic>
+        <p:nvPicPr>
+          <p:cNvPr id="6148" name="Picture 4">
+            <a:extLst>
+              <a:ext uri="{FF2B5EF4-FFF2-40B4-BE49-F238E27FC236}">
+                <a16:creationId xmlns:a16="http://schemas.microsoft.com/office/drawing/2014/main" id="{11CF4493-51AD-4357-8A80-9DE40DCD4386}"/>
+              </a:ext>
+            </a:extLst>
+          </p:cNvPr>
+          <p:cNvPicPr>
+            <a:picLocks noChangeAspect="1" noChangeArrowheads="1"/>
+          </p:cNvPicPr>
+          <p:nvPr/>
+        </p:nvPicPr>
+        <p:blipFill>
+          <a:blip r:embed="rId32">
+            <a:extLst>
+              <a:ext uri="{28A0092B-C50C-407E-A947-70E740481C1C}">
+                <a14:useLocalDpi xmlns:a14="http://schemas.microsoft.com/office/drawing/2010/main" val="0"/>
+              </a:ext>
+            </a:extLst>
+          </a:blip>
+          <a:srcRect/>
+          <a:stretch>
+            <a:fillRect/>
+          </a:stretch>
+        </p:blipFill>
+        <p:spPr bwMode="auto">
+          <a:xfrm>
+            <a:off x="46101000" y="4064000"/>
+            <a:ext cx="6946900" cy="2565400"/>
+          </a:xfrm>
+          <a:prstGeom prst="rect">
+            <a:avLst/>
+          </a:prstGeom>
+          <a:noFill/>
+          <a:ln>
+            <a:noFill/>
+          </a:ln>
+          <a:extLst>
+            <a:ext uri="{909E8E84-426E-40DD-AFC4-6F175D3DCCD1}">
+              <a14:hiddenFill xmlns:a14="http://schemas.microsoft.com/office/drawing/2010/main">
+                <a:solidFill>
+                  <a:srgbClr val="FFFFFF"/>
+                </a:solidFill>
+              </a14:hiddenFill>
+            </a:ext>
+            <a:ext uri="{91240B29-F687-4F45-9708-019B960494DF}">
+              <a14:hiddenLine xmlns:a14="http://schemas.microsoft.com/office/drawing/2010/main" w="9525">
+                <a:solidFill>
+                  <a:srgbClr val="000000"/>
+                </a:solidFill>
+                <a:miter lim="800000"/>
+                <a:headEnd/>
+                <a:tailEnd/>
+              </a14:hiddenLine>
+            </a:ext>
+          </a:extLst>
+        </p:spPr>
+      </p:pic>
+      <p:pic>
+        <p:nvPicPr>
+          <p:cNvPr id="6149" name="Picture 5">
+            <a:extLst>
+              <a:ext uri="{FF2B5EF4-FFF2-40B4-BE49-F238E27FC236}">
+                <a16:creationId xmlns:a16="http://schemas.microsoft.com/office/drawing/2014/main" id="{4CE65534-869D-4BE2-9376-3843E4FADDCF}"/>
+              </a:ext>
+            </a:extLst>
+          </p:cNvPr>
+          <p:cNvPicPr>
+            <a:picLocks noChangeAspect="1" noChangeArrowheads="1"/>
+          </p:cNvPicPr>
+          <p:nvPr/>
+        </p:nvPicPr>
+        <p:blipFill>
+          <a:blip r:embed="rId33">
+            <a:extLst>
+              <a:ext uri="{28A0092B-C50C-407E-A947-70E740481C1C}">
+                <a14:useLocalDpi xmlns:a14="http://schemas.microsoft.com/office/drawing/2010/main" val="0"/>
+              </a:ext>
+            </a:extLst>
+          </a:blip>
+          <a:srcRect/>
+          <a:stretch>
+            <a:fillRect/>
+          </a:stretch>
+        </p:blipFill>
+        <p:spPr bwMode="auto">
+          <a:xfrm>
+            <a:off x="44615100" y="15798800"/>
+            <a:ext cx="1473200" cy="990600"/>
+          </a:xfrm>
+          <a:prstGeom prst="rect">
+            <a:avLst/>
+          </a:prstGeom>
+          <a:noFill/>
+          <a:ln>
+            <a:noFill/>
+          </a:ln>
+          <a:extLst>
+            <a:ext uri="{909E8E84-426E-40DD-AFC4-6F175D3DCCD1}">
+              <a14:hiddenFill xmlns:a14="http://schemas.microsoft.com/office/drawing/2010/main">
+                <a:solidFill>
+                  <a:srgbClr val="FFFFFF"/>
+                </a:solidFill>
+              </a14:hiddenFill>
+            </a:ext>
+            <a:ext uri="{91240B29-F687-4F45-9708-019B960494DF}">
+              <a14:hiddenLine xmlns:a14="http://schemas.microsoft.com/office/drawing/2010/main" w="9525">
+                <a:solidFill>
+                  <a:srgbClr val="000000"/>
+                </a:solidFill>
+                <a:miter lim="800000"/>
+                <a:headEnd/>
+                <a:tailEnd/>
+              </a14:hiddenLine>
+            </a:ext>
+          </a:extLst>
+        </p:spPr>
+      </p:pic>
     </p:spTree>
     <p:extLst>
       <p:ext uri="{BB962C8B-B14F-4D97-AF65-F5344CB8AC3E}">
@@ -17275,8 +17515,8 @@
         </p:nvSpPr>
         <p:spPr>
           <a:xfrm>
-            <a:off x="1216940" y="10039283"/>
-            <a:ext cx="6517496" cy="2914339"/>
+            <a:off x="1379038" y="7483950"/>
+            <a:ext cx="12173675" cy="6399909"/>
           </a:xfrm>
         </p:spPr>
         <p:txBody>
@@ -17284,36 +17524,390 @@
           <a:lstStyle/>
           <a:p>
             <a:r>
-              <a:rPr lang="en-US" sz="3200" dirty="0"/>
-              <a:t>Many different games have a probabilistic component and it is a challenge to get a smart player which could maximize the expected probability of the utilities</a:t>
-            </a:r>
-          </a:p>
-        </p:txBody>
-      </p:sp>
-      <p:sp>
-        <p:nvSpPr>
-          <p:cNvPr id="334" name="Text Placeholder 333"/>
-          <p:cNvSpPr>
-            <a:spLocks noGrp="1"/>
-          </p:cNvSpPr>
-          <p:nvPr>
-            <p:ph type="body" sz="quarter" idx="11"/>
-          </p:nvPr>
-        </p:nvSpPr>
-        <p:spPr>
-          <a:xfrm>
-            <a:off x="7989128" y="7793200"/>
-            <a:ext cx="6517496" cy="1929454"/>
-          </a:xfrm>
-        </p:spPr>
-        <p:txBody>
-          <a:bodyPr/>
-          <a:lstStyle/>
-          <a:p>
-            <a:r>
-              <a:rPr lang="en-US" sz="3200" dirty="0"/>
-              <a:t>Games have historically been a popular benchmark for machines intelligence</a:t>
-            </a:r>
+              <a:rPr lang="en-US" sz="3600" dirty="0" err="1"/>
+              <a:t>Es</a:t>
+            </a:r>
+            <a:r>
+              <a:rPr lang="en-US" sz="3600" dirty="0"/>
+              <a:t> </a:t>
+            </a:r>
+            <a:r>
+              <a:rPr lang="en-US" sz="3600" dirty="0" err="1"/>
+              <a:t>muy</a:t>
+            </a:r>
+            <a:r>
+              <a:rPr lang="en-US" sz="3600" dirty="0"/>
+              <a:t> </a:t>
+            </a:r>
+            <a:r>
+              <a:rPr lang="en-US" sz="3600" dirty="0" err="1"/>
+              <a:t>frecuente</a:t>
+            </a:r>
+            <a:r>
+              <a:rPr lang="en-US" sz="3600" dirty="0"/>
+              <a:t> el </a:t>
+            </a:r>
+            <a:r>
+              <a:rPr lang="en-US" sz="3600" dirty="0" err="1"/>
+              <a:t>escenario</a:t>
+            </a:r>
+            <a:r>
+              <a:rPr lang="en-US" sz="3600" dirty="0"/>
+              <a:t> </a:t>
+            </a:r>
+            <a:r>
+              <a:rPr lang="en-US" sz="3600" dirty="0" err="1"/>
+              <a:t>en</a:t>
+            </a:r>
+            <a:r>
+              <a:rPr lang="en-US" sz="3600" dirty="0"/>
+              <a:t> el que se </a:t>
+            </a:r>
+            <a:r>
+              <a:rPr lang="en-US" sz="3600" dirty="0" err="1"/>
+              <a:t>utilizan</a:t>
+            </a:r>
+            <a:r>
+              <a:rPr lang="en-US" sz="3600" dirty="0"/>
+              <a:t> </a:t>
+            </a:r>
+            <a:r>
+              <a:rPr lang="en-US" sz="3600" dirty="0" err="1"/>
+              <a:t>libros</a:t>
+            </a:r>
+            <a:r>
+              <a:rPr lang="en-US" sz="3600" dirty="0"/>
+              <a:t> </a:t>
+            </a:r>
+            <a:r>
+              <a:rPr lang="en-US" sz="3600" dirty="0" err="1"/>
+              <a:t>unicamente</a:t>
+            </a:r>
+            <a:r>
+              <a:rPr lang="en-US" sz="3600" dirty="0"/>
+              <a:t> </a:t>
+            </a:r>
+            <a:r>
+              <a:rPr lang="en-US" sz="3600" dirty="0" err="1"/>
+              <a:t>en</a:t>
+            </a:r>
+            <a:r>
+              <a:rPr lang="en-US" sz="3600" dirty="0"/>
+              <a:t> un </a:t>
+            </a:r>
+            <a:r>
+              <a:rPr lang="en-US" sz="3600" dirty="0" err="1"/>
+              <a:t>periodo</a:t>
+            </a:r>
+            <a:r>
+              <a:rPr lang="en-US" sz="3600" dirty="0"/>
+              <a:t> de </a:t>
+            </a:r>
+            <a:r>
+              <a:rPr lang="en-US" sz="3600" dirty="0" err="1"/>
+              <a:t>tiempo</a:t>
+            </a:r>
+            <a:r>
+              <a:rPr lang="en-US" sz="3600" dirty="0"/>
+              <a:t> </a:t>
+            </a:r>
+            <a:r>
+              <a:rPr lang="en-US" sz="3600" dirty="0" err="1"/>
+              <a:t>corto</a:t>
+            </a:r>
+            <a:r>
+              <a:rPr lang="en-US" sz="3600" dirty="0"/>
+              <a:t> y </a:t>
+            </a:r>
+            <a:r>
+              <a:rPr lang="en-US" sz="3600" dirty="0" err="1"/>
+              <a:t>luego</a:t>
+            </a:r>
+            <a:r>
+              <a:rPr lang="en-US" sz="3600" dirty="0"/>
+              <a:t> se </a:t>
+            </a:r>
+            <a:r>
+              <a:rPr lang="en-US" sz="3600" dirty="0" err="1"/>
+              <a:t>dejan</a:t>
+            </a:r>
+            <a:r>
+              <a:rPr lang="en-US" sz="3600" dirty="0"/>
+              <a:t> sin </a:t>
+            </a:r>
+            <a:r>
+              <a:rPr lang="en-US" sz="3600" dirty="0" err="1"/>
+              <a:t>utilizar</a:t>
+            </a:r>
+            <a:endParaRPr lang="en-US" sz="3600" dirty="0"/>
+          </a:p>
+          <a:p>
+            <a:r>
+              <a:rPr lang="en-US" sz="3600" dirty="0"/>
+              <a:t>Se </a:t>
+            </a:r>
+            <a:r>
+              <a:rPr lang="en-US" sz="3600" dirty="0" err="1"/>
+              <a:t>ve</a:t>
+            </a:r>
+            <a:r>
+              <a:rPr lang="en-US" sz="3600" dirty="0"/>
+              <a:t> </a:t>
+            </a:r>
+            <a:r>
+              <a:rPr lang="en-US" sz="3600" dirty="0" err="1"/>
+              <a:t>como</a:t>
+            </a:r>
+            <a:r>
+              <a:rPr lang="en-US" sz="3600" dirty="0"/>
+              <a:t> </a:t>
+            </a:r>
+            <a:r>
+              <a:rPr lang="en-US" sz="3600" dirty="0" err="1"/>
+              <a:t>una</a:t>
+            </a:r>
+            <a:r>
+              <a:rPr lang="en-US" sz="3600" dirty="0"/>
+              <a:t> </a:t>
+            </a:r>
+            <a:r>
+              <a:rPr lang="en-US" sz="3600" dirty="0" err="1"/>
+              <a:t>oportunidad</a:t>
+            </a:r>
+            <a:r>
+              <a:rPr lang="en-US" sz="3600" dirty="0"/>
+              <a:t> de </a:t>
+            </a:r>
+            <a:r>
+              <a:rPr lang="en-US" sz="3600" dirty="0" err="1"/>
+              <a:t>negocio</a:t>
+            </a:r>
+            <a:r>
+              <a:rPr lang="en-US" sz="3600" dirty="0"/>
+              <a:t>  la </a:t>
+            </a:r>
+            <a:r>
+              <a:rPr lang="en-US" sz="3600" dirty="0" err="1"/>
+              <a:t>reutilización</a:t>
+            </a:r>
+            <a:r>
+              <a:rPr lang="en-US" sz="3600" dirty="0"/>
+              <a:t> de </a:t>
+            </a:r>
+            <a:r>
+              <a:rPr lang="en-US" sz="3600" dirty="0" err="1"/>
+              <a:t>libros</a:t>
+            </a:r>
+            <a:r>
+              <a:rPr lang="en-US" sz="3600" dirty="0"/>
+              <a:t>, que se </a:t>
+            </a:r>
+            <a:r>
+              <a:rPr lang="en-US" sz="3600" dirty="0" err="1"/>
+              <a:t>puedan</a:t>
+            </a:r>
+            <a:r>
+              <a:rPr lang="en-US" sz="3600" dirty="0"/>
+              <a:t> </a:t>
+            </a:r>
+            <a:r>
+              <a:rPr lang="en-US" sz="3600" dirty="0" err="1"/>
+              <a:t>intercambiar</a:t>
+            </a:r>
+            <a:r>
+              <a:rPr lang="en-US" sz="3600" dirty="0"/>
+              <a:t> </a:t>
+            </a:r>
+            <a:r>
+              <a:rPr lang="en-US" sz="3600" dirty="0" err="1"/>
+              <a:t>libros</a:t>
+            </a:r>
+            <a:r>
+              <a:rPr lang="en-US" sz="3600" dirty="0"/>
+              <a:t> que </a:t>
+            </a:r>
+            <a:r>
+              <a:rPr lang="en-US" sz="3600" dirty="0" err="1"/>
+              <a:t>uno</a:t>
+            </a:r>
+            <a:r>
+              <a:rPr lang="en-US" sz="3600" dirty="0"/>
+              <a:t> </a:t>
+            </a:r>
+            <a:r>
+              <a:rPr lang="en-US" sz="3600" dirty="0" err="1"/>
+              <a:t>tenga</a:t>
+            </a:r>
+            <a:r>
+              <a:rPr lang="en-US" sz="3600" dirty="0"/>
+              <a:t> </a:t>
+            </a:r>
+            <a:r>
+              <a:rPr lang="en-US" sz="3600" dirty="0" err="1"/>
+              <a:t>por</a:t>
+            </a:r>
+            <a:r>
+              <a:rPr lang="en-US" sz="3600" dirty="0"/>
+              <a:t> </a:t>
+            </a:r>
+            <a:r>
+              <a:rPr lang="en-US" sz="3600" dirty="0" err="1"/>
+              <a:t>otro</a:t>
+            </a:r>
+            <a:r>
+              <a:rPr lang="en-US" sz="3600" dirty="0"/>
+              <a:t> que </a:t>
+            </a:r>
+            <a:r>
+              <a:rPr lang="en-US" sz="3600" dirty="0" err="1"/>
+              <a:t>uno</a:t>
+            </a:r>
+            <a:r>
+              <a:rPr lang="en-US" sz="3600" dirty="0"/>
+              <a:t> </a:t>
+            </a:r>
+            <a:r>
+              <a:rPr lang="en-US" sz="3600" dirty="0" err="1"/>
+              <a:t>necesite</a:t>
+            </a:r>
+            <a:endParaRPr lang="en-US" sz="3600" dirty="0"/>
+          </a:p>
+          <a:p>
+            <a:r>
+              <a:rPr lang="en-US" sz="3600" dirty="0" err="1"/>
+              <a:t>Actualmente</a:t>
+            </a:r>
+            <a:r>
+              <a:rPr lang="en-US" sz="3600" dirty="0"/>
+              <a:t> hay </a:t>
+            </a:r>
+            <a:r>
+              <a:rPr lang="en-US" sz="3600" dirty="0" err="1"/>
+              <a:t>pocos</a:t>
+            </a:r>
+            <a:r>
+              <a:rPr lang="en-US" sz="3600" dirty="0"/>
+              <a:t> </a:t>
+            </a:r>
+            <a:r>
+              <a:rPr lang="en-US" sz="3600" dirty="0" err="1"/>
+              <a:t>espacios</a:t>
+            </a:r>
+            <a:r>
+              <a:rPr lang="en-US" sz="3600" dirty="0"/>
+              <a:t> </a:t>
+            </a:r>
+            <a:r>
+              <a:rPr lang="en-US" sz="3600" dirty="0" err="1"/>
+              <a:t>donde</a:t>
+            </a:r>
+            <a:r>
+              <a:rPr lang="en-US" sz="3600" dirty="0"/>
+              <a:t> </a:t>
+            </a:r>
+            <a:r>
+              <a:rPr lang="en-US" sz="3600" dirty="0" err="1"/>
+              <a:t>realizar</a:t>
+            </a:r>
+            <a:r>
+              <a:rPr lang="en-US" sz="3600" dirty="0"/>
+              <a:t> </a:t>
+            </a:r>
+            <a:r>
+              <a:rPr lang="en-US" sz="3600" dirty="0" err="1"/>
+              <a:t>este</a:t>
+            </a:r>
+            <a:r>
+              <a:rPr lang="en-US" sz="3600" dirty="0"/>
+              <a:t> </a:t>
+            </a:r>
+            <a:r>
+              <a:rPr lang="en-US" sz="3600" dirty="0" err="1"/>
+              <a:t>tipo</a:t>
+            </a:r>
+            <a:r>
+              <a:rPr lang="en-US" sz="3600" dirty="0"/>
+              <a:t> de </a:t>
+            </a:r>
+            <a:r>
+              <a:rPr lang="en-US" sz="3600" dirty="0" err="1"/>
+              <a:t>intercambios</a:t>
+            </a:r>
+            <a:r>
+              <a:rPr lang="en-US" sz="3600" dirty="0"/>
+              <a:t> </a:t>
+            </a:r>
+            <a:r>
+              <a:rPr lang="en-US" sz="3600" dirty="0" err="1"/>
+              <a:t>es</a:t>
+            </a:r>
+            <a:r>
+              <a:rPr lang="en-US" sz="3600" dirty="0"/>
+              <a:t> possible</a:t>
+            </a:r>
+          </a:p>
+          <a:p>
+            <a:r>
+              <a:rPr lang="en-US" sz="3600" dirty="0" err="1"/>
+              <a:t>Proponemos</a:t>
+            </a:r>
+            <a:r>
+              <a:rPr lang="en-US" sz="3600" dirty="0"/>
+              <a:t> </a:t>
+            </a:r>
+            <a:r>
+              <a:rPr lang="en-US" sz="3600" dirty="0" err="1"/>
+              <a:t>una</a:t>
+            </a:r>
+            <a:r>
+              <a:rPr lang="en-US" sz="3600" dirty="0"/>
+              <a:t> </a:t>
+            </a:r>
+            <a:r>
+              <a:rPr lang="en-US" sz="3600" dirty="0" err="1"/>
+              <a:t>aplicación</a:t>
+            </a:r>
+            <a:r>
+              <a:rPr lang="en-US" sz="3600" dirty="0"/>
+              <a:t> </a:t>
+            </a:r>
+            <a:r>
+              <a:rPr lang="en-US" sz="3600" dirty="0" err="1"/>
+              <a:t>movil</a:t>
+            </a:r>
+            <a:r>
+              <a:rPr lang="en-US" sz="3600" dirty="0"/>
+              <a:t> que </a:t>
+            </a:r>
+            <a:r>
+              <a:rPr lang="en-US" sz="3600" dirty="0" err="1"/>
+              <a:t>ayude</a:t>
+            </a:r>
+            <a:r>
+              <a:rPr lang="en-US" sz="3600" dirty="0"/>
+              <a:t> a </a:t>
+            </a:r>
+            <a:r>
+              <a:rPr lang="en-US" sz="3600" dirty="0" err="1"/>
+              <a:t>realizar</a:t>
+            </a:r>
+            <a:r>
+              <a:rPr lang="en-US" sz="3600" dirty="0"/>
+              <a:t> </a:t>
+            </a:r>
+            <a:r>
+              <a:rPr lang="en-US" sz="3600" dirty="0" err="1"/>
+              <a:t>esto</a:t>
+            </a:r>
+            <a:r>
+              <a:rPr lang="en-US" sz="3600" dirty="0"/>
+              <a:t> de forma </a:t>
+            </a:r>
+            <a:r>
+              <a:rPr lang="en-US" sz="3600" dirty="0" err="1"/>
+              <a:t>efectiva</a:t>
+            </a:r>
+            <a:endParaRPr lang="en-US" sz="3600" dirty="0"/>
           </a:p>
         </p:txBody>
       </p:sp>
@@ -17356,7 +17950,7 @@
         </p:nvSpPr>
         <p:spPr>
           <a:xfrm>
-            <a:off x="659243" y="13291563"/>
+            <a:off x="588757" y="14008053"/>
             <a:ext cx="14291358" cy="720999"/>
           </a:xfrm>
         </p:spPr>
@@ -17383,7 +17977,7 @@
         </p:nvSpPr>
         <p:spPr>
           <a:xfrm>
-            <a:off x="15513657" y="17646436"/>
+            <a:off x="16183358" y="34843634"/>
             <a:ext cx="14283756" cy="720999"/>
           </a:xfrm>
         </p:spPr>
@@ -17410,8 +18004,8 @@
         </p:nvSpPr>
         <p:spPr>
           <a:xfrm>
-            <a:off x="24940732" y="30092445"/>
-            <a:ext cx="4205775" cy="5376552"/>
+            <a:off x="16297851" y="36318432"/>
+            <a:ext cx="10533522" cy="2681783"/>
           </a:xfrm>
         </p:spPr>
         <p:txBody>
@@ -17684,7 +18278,7 @@
         </p:nvSpPr>
         <p:spPr>
           <a:xfrm>
-            <a:off x="1216940" y="13964733"/>
+            <a:off x="1273316" y="14940497"/>
             <a:ext cx="13229330" cy="1560122"/>
           </a:xfrm>
           <a:prstGeom prst="rect">
@@ -17837,8 +18431,85 @@
           <a:p>
             <a:r>
               <a:rPr lang="en-US" sz="3600" dirty="0"/>
-              <a:t>The main objective of the project is to use intelligent systems approaches to implement an smart player for the dominoes game.</a:t>
-            </a:r>
+              <a:t>El </a:t>
+            </a:r>
+            <a:r>
+              <a:rPr lang="en-US" sz="3600" dirty="0" err="1"/>
+              <a:t>objetivo</a:t>
+            </a:r>
+            <a:r>
+              <a:rPr lang="en-US" sz="3600" dirty="0"/>
+              <a:t> principal del Proyecto </a:t>
+            </a:r>
+            <a:r>
+              <a:rPr lang="en-US" sz="3600" dirty="0" err="1"/>
+              <a:t>es</a:t>
+            </a:r>
+            <a:r>
+              <a:rPr lang="en-US" sz="3600" dirty="0"/>
+              <a:t> </a:t>
+            </a:r>
+            <a:r>
+              <a:rPr lang="en-US" sz="3600" dirty="0" err="1"/>
+              <a:t>desarrollar</a:t>
+            </a:r>
+            <a:r>
+              <a:rPr lang="en-US" sz="3600" dirty="0"/>
+              <a:t> </a:t>
+            </a:r>
+            <a:r>
+              <a:rPr lang="en-US" sz="3600" dirty="0" err="1"/>
+              <a:t>una</a:t>
+            </a:r>
+            <a:r>
+              <a:rPr lang="en-US" sz="3600" dirty="0"/>
+              <a:t> </a:t>
+            </a:r>
+            <a:r>
+              <a:rPr lang="en-US" sz="3600" dirty="0" err="1"/>
+              <a:t>aplicacion</a:t>
+            </a:r>
+            <a:r>
+              <a:rPr lang="en-US" sz="3600" dirty="0"/>
+              <a:t> </a:t>
+            </a:r>
+            <a:r>
+              <a:rPr lang="en-US" sz="3600" dirty="0" err="1"/>
+              <a:t>amigable</a:t>
+            </a:r>
+            <a:r>
+              <a:rPr lang="en-US" sz="3600" dirty="0"/>
+              <a:t> con el </a:t>
+            </a:r>
+            <a:r>
+              <a:rPr lang="en-US" sz="3600" dirty="0" err="1"/>
+              <a:t>usuario</a:t>
+            </a:r>
+            <a:r>
+              <a:rPr lang="en-US" sz="3600" dirty="0"/>
+              <a:t> para </a:t>
+            </a:r>
+            <a:r>
+              <a:rPr lang="en-US" sz="3600" dirty="0" err="1"/>
+              <a:t>realizar</a:t>
+            </a:r>
+            <a:r>
+              <a:rPr lang="en-US" sz="3600" dirty="0"/>
+              <a:t> </a:t>
+            </a:r>
+            <a:r>
+              <a:rPr lang="en-US" sz="3600" dirty="0" err="1"/>
+              <a:t>trueques</a:t>
+            </a:r>
+            <a:r>
+              <a:rPr lang="en-US" sz="3600" dirty="0"/>
+              <a:t> de </a:t>
+            </a:r>
+            <a:r>
+              <a:rPr lang="en-US" sz="3600" dirty="0" err="1"/>
+              <a:t>libros</a:t>
+            </a:r>
+            <a:endParaRPr lang="en-US" sz="3600" dirty="0"/>
           </a:p>
         </p:txBody>
       </p:sp>
@@ -17852,7 +18523,7 @@
         </p:nvSpPr>
         <p:spPr>
           <a:xfrm>
-            <a:off x="588757" y="19979777"/>
+            <a:off x="320196" y="21476087"/>
             <a:ext cx="14291358" cy="800265"/>
           </a:xfrm>
           <a:prstGeom prst="rect">
@@ -18011,96 +18682,6 @@
           </a:p>
         </p:txBody>
       </p:sp>
-      <p:pic>
-        <p:nvPicPr>
-          <p:cNvPr id="14" name="Picture 13"/>
-          <p:cNvPicPr>
-            <a:picLocks noChangeAspect="1"/>
-          </p:cNvPicPr>
-          <p:nvPr/>
-        </p:nvPicPr>
-        <p:blipFill>
-          <a:blip r:embed="rId4" cstate="print">
-            <a:extLst>
-              <a:ext uri="{28A0092B-C50C-407E-A947-70E740481C1C}">
-                <a14:useLocalDpi xmlns:a14="http://schemas.microsoft.com/office/drawing/2010/main" val="0"/>
-              </a:ext>
-            </a:extLst>
-          </a:blip>
-          <a:stretch>
-            <a:fillRect/>
-          </a:stretch>
-        </p:blipFill>
-        <p:spPr>
-          <a:xfrm>
-            <a:off x="1067425" y="29596070"/>
-            <a:ext cx="8735862" cy="5303916"/>
-          </a:xfrm>
-          <a:prstGeom prst="rect">
-            <a:avLst/>
-          </a:prstGeom>
-        </p:spPr>
-      </p:pic>
-      <p:pic>
-        <p:nvPicPr>
-          <p:cNvPr id="15" name="Picture 14"/>
-          <p:cNvPicPr>
-            <a:picLocks noChangeAspect="1"/>
-          </p:cNvPicPr>
-          <p:nvPr/>
-        </p:nvPicPr>
-        <p:blipFill>
-          <a:blip r:embed="rId5" cstate="print">
-            <a:extLst>
-              <a:ext uri="{28A0092B-C50C-407E-A947-70E740481C1C}">
-                <a14:useLocalDpi xmlns:a14="http://schemas.microsoft.com/office/drawing/2010/main" val="0"/>
-              </a:ext>
-            </a:extLst>
-          </a:blip>
-          <a:stretch>
-            <a:fillRect/>
-          </a:stretch>
-        </p:blipFill>
-        <p:spPr>
-          <a:xfrm>
-            <a:off x="16183358" y="6961418"/>
-            <a:ext cx="7790675" cy="4730052"/>
-          </a:xfrm>
-          <a:prstGeom prst="rect">
-            <a:avLst/>
-          </a:prstGeom>
-        </p:spPr>
-      </p:pic>
-      <p:pic>
-        <p:nvPicPr>
-          <p:cNvPr id="20" name="Picture 19"/>
-          <p:cNvPicPr>
-            <a:picLocks noChangeAspect="1"/>
-          </p:cNvPicPr>
-          <p:nvPr/>
-        </p:nvPicPr>
-        <p:blipFill>
-          <a:blip r:embed="rId6" cstate="print">
-            <a:extLst>
-              <a:ext uri="{28A0092B-C50C-407E-A947-70E740481C1C}">
-                <a14:useLocalDpi xmlns:a14="http://schemas.microsoft.com/office/drawing/2010/main" val="0"/>
-              </a:ext>
-            </a:extLst>
-          </a:blip>
-          <a:stretch>
-            <a:fillRect/>
-          </a:stretch>
-        </p:blipFill>
-        <p:spPr>
-          <a:xfrm>
-            <a:off x="5813297" y="35511200"/>
-            <a:ext cx="8612607" cy="5229082"/>
-          </a:xfrm>
-          <a:prstGeom prst="rect">
-            <a:avLst/>
-          </a:prstGeom>
-        </p:spPr>
-      </p:pic>
       <p:sp>
         <p:nvSpPr>
           <p:cNvPr id="46" name="Text Placeholder 345"/>
@@ -18111,8 +18692,8 @@
         </p:nvSpPr>
         <p:spPr>
           <a:xfrm>
-            <a:off x="1216940" y="15415047"/>
-            <a:ext cx="13229330" cy="3973090"/>
+            <a:off x="1216940" y="16526687"/>
+            <a:ext cx="13229330" cy="4785621"/>
           </a:xfrm>
           <a:prstGeom prst="rect">
             <a:avLst/>
@@ -18263,8 +18844,44 @@
           </a:lstStyle>
           <a:p>
             <a:r>
+              <a:rPr lang="en-US" sz="3200" dirty="0" err="1"/>
+              <a:t>Algunos</a:t>
+            </a:r>
+            <a:r>
               <a:rPr lang="en-US" sz="3200" dirty="0"/>
-              <a:t>Some intermediate objectives are the following:</a:t>
+              <a:t> </a:t>
+            </a:r>
+            <a:r>
+              <a:rPr lang="en-US" sz="3200" dirty="0" err="1"/>
+              <a:t>objetivos</a:t>
+            </a:r>
+            <a:r>
+              <a:rPr lang="en-US" sz="3200" dirty="0"/>
+              <a:t> </a:t>
+            </a:r>
+            <a:r>
+              <a:rPr lang="en-US" sz="3200" dirty="0" err="1"/>
+              <a:t>intermedios</a:t>
+            </a:r>
+            <a:r>
+              <a:rPr lang="en-US" sz="3200" dirty="0"/>
+              <a:t> son </a:t>
+            </a:r>
+            <a:r>
+              <a:rPr lang="en-US" sz="3200" dirty="0" err="1"/>
+              <a:t>los</a:t>
+            </a:r>
+            <a:r>
+              <a:rPr lang="en-US" sz="3200" dirty="0"/>
+              <a:t> </a:t>
+            </a:r>
+            <a:r>
+              <a:rPr lang="en-US" sz="3200" dirty="0" err="1"/>
+              <a:t>siguientes</a:t>
+            </a:r>
+            <a:r>
+              <a:rPr lang="en-US" sz="3200" dirty="0"/>
+              <a:t>:</a:t>
             </a:r>
           </a:p>
           <a:p>
@@ -18273,9 +18890,74 @@
               <a:buChar char="•"/>
             </a:pPr>
             <a:r>
+              <a:rPr lang="en-US" sz="3200" dirty="0" err="1"/>
+              <a:t>Implementar</a:t>
+            </a:r>
+            <a:r>
               <a:rPr lang="en-US" sz="3200" dirty="0"/>
-              <a:t>Implement an environment for the dominoes game</a:t>
-            </a:r>
+              <a:t> </a:t>
+            </a:r>
+            <a:r>
+              <a:rPr lang="en-US" sz="3200" dirty="0" err="1"/>
+              <a:t>una</a:t>
+            </a:r>
+            <a:r>
+              <a:rPr lang="en-US" sz="3200" dirty="0"/>
+              <a:t> </a:t>
+            </a:r>
+            <a:r>
+              <a:rPr lang="en-US" sz="3200" dirty="0" err="1"/>
+              <a:t>interfaz</a:t>
+            </a:r>
+            <a:r>
+              <a:rPr lang="en-US" sz="3200" dirty="0"/>
+              <a:t> que </a:t>
+            </a:r>
+            <a:r>
+              <a:rPr lang="en-US" sz="3200" dirty="0" err="1"/>
+              <a:t>registre</a:t>
+            </a:r>
+            <a:r>
+              <a:rPr lang="en-US" sz="3200" dirty="0"/>
+              <a:t> </a:t>
+            </a:r>
+            <a:r>
+              <a:rPr lang="en-US" sz="3200" dirty="0" err="1"/>
+              <a:t>usuarios</a:t>
+            </a:r>
+            <a:r>
+              <a:rPr lang="en-US" sz="3200" dirty="0"/>
+              <a:t> </a:t>
+            </a:r>
+            <a:r>
+              <a:rPr lang="en-US" sz="3200" dirty="0" err="1"/>
+              <a:t>interesados</a:t>
+            </a:r>
+            <a:r>
+              <a:rPr lang="en-US" sz="3200" dirty="0"/>
+              <a:t> </a:t>
+            </a:r>
+            <a:r>
+              <a:rPr lang="en-US" sz="3200" dirty="0" err="1"/>
+              <a:t>en</a:t>
+            </a:r>
+            <a:r>
+              <a:rPr lang="en-US" sz="3200" dirty="0"/>
+              <a:t> el </a:t>
+            </a:r>
+            <a:r>
+              <a:rPr lang="en-US" sz="3200" dirty="0" err="1"/>
+              <a:t>intercambio</a:t>
+            </a:r>
+            <a:r>
+              <a:rPr lang="en-US" sz="3200" dirty="0"/>
+              <a:t> de </a:t>
+            </a:r>
+            <a:r>
+              <a:rPr lang="en-US" sz="3200" dirty="0" err="1"/>
+              <a:t>libros</a:t>
+            </a:r>
+            <a:endParaRPr lang="en-US" sz="3200" dirty="0"/>
           </a:p>
           <a:p>
             <a:pPr marL="571500" indent="-571500">
@@ -18283,9 +18965,82 @@
               <a:buChar char="•"/>
             </a:pPr>
             <a:r>
+              <a:rPr lang="en-US" sz="3200" dirty="0" err="1"/>
+              <a:t>Desarrollar</a:t>
+            </a:r>
+            <a:r>
               <a:rPr lang="en-US" sz="3200" dirty="0"/>
-              <a:t>Implement different initial players to see the behavior of the game</a:t>
-            </a:r>
+              <a:t> un </a:t>
+            </a:r>
+            <a:r>
+              <a:rPr lang="en-US" sz="3200" dirty="0" err="1"/>
+              <a:t>buscador</a:t>
+            </a:r>
+            <a:r>
+              <a:rPr lang="en-US" sz="3200" dirty="0"/>
+              <a:t> que </a:t>
+            </a:r>
+            <a:r>
+              <a:rPr lang="en-US" sz="3200" dirty="0" err="1"/>
+              <a:t>logre</a:t>
+            </a:r>
+            <a:r>
+              <a:rPr lang="en-US" sz="3200" dirty="0"/>
+              <a:t> </a:t>
+            </a:r>
+            <a:r>
+              <a:rPr lang="en-US" sz="3200" dirty="0" err="1"/>
+              <a:t>obtener</a:t>
+            </a:r>
+            <a:r>
+              <a:rPr lang="en-US" sz="3200" dirty="0"/>
+              <a:t> </a:t>
+            </a:r>
+            <a:r>
+              <a:rPr lang="en-US" sz="3200" dirty="0" err="1"/>
+              <a:t>información</a:t>
+            </a:r>
+            <a:r>
+              <a:rPr lang="en-US" sz="3200" dirty="0"/>
+              <a:t> </a:t>
+            </a:r>
+            <a:r>
+              <a:rPr lang="en-US" sz="3200" dirty="0" err="1"/>
+              <a:t>sobre</a:t>
+            </a:r>
+            <a:r>
+              <a:rPr lang="en-US" sz="3200" dirty="0"/>
+              <a:t> </a:t>
+            </a:r>
+            <a:r>
+              <a:rPr lang="en-US" sz="3200" dirty="0" err="1"/>
+              <a:t>los</a:t>
+            </a:r>
+            <a:r>
+              <a:rPr lang="en-US" sz="3200" dirty="0"/>
+              <a:t> </a:t>
+            </a:r>
+            <a:r>
+              <a:rPr lang="en-US" sz="3200" dirty="0" err="1"/>
+              <a:t>libros</a:t>
+            </a:r>
+            <a:r>
+              <a:rPr lang="en-US" sz="3200" dirty="0"/>
+              <a:t> </a:t>
+            </a:r>
+            <a:r>
+              <a:rPr lang="en-US" sz="3200" dirty="0" err="1"/>
+              <a:t>ofertados</a:t>
+            </a:r>
+            <a:r>
+              <a:rPr lang="en-US" sz="3200" dirty="0"/>
+              <a:t> para </a:t>
+            </a:r>
+            <a:r>
+              <a:rPr lang="en-US" sz="3200" dirty="0" err="1"/>
+              <a:t>trueques</a:t>
+            </a:r>
+            <a:endParaRPr lang="en-US" sz="3200" dirty="0"/>
           </a:p>
           <a:p>
             <a:pPr marL="571500" indent="-571500">
@@ -18293,9 +19048,114 @@
               <a:buChar char="•"/>
             </a:pPr>
             <a:r>
+              <a:rPr lang="en-US" sz="3200" dirty="0" err="1"/>
+              <a:t>Ofrecer</a:t>
+            </a:r>
+            <a:r>
               <a:rPr lang="en-US" sz="3200" dirty="0"/>
-              <a:t>Collect automatically relevant data from the players</a:t>
-            </a:r>
+              <a:t> </a:t>
+            </a:r>
+            <a:r>
+              <a:rPr lang="en-US" sz="3200" dirty="0" err="1"/>
+              <a:t>una</a:t>
+            </a:r>
+            <a:r>
+              <a:rPr lang="en-US" sz="3200" dirty="0"/>
+              <a:t> </a:t>
+            </a:r>
+            <a:r>
+              <a:rPr lang="en-US" sz="3200" dirty="0" err="1"/>
+              <a:t>plataforma</a:t>
+            </a:r>
+            <a:r>
+              <a:rPr lang="en-US" sz="3200" dirty="0"/>
+              <a:t> </a:t>
+            </a:r>
+            <a:r>
+              <a:rPr lang="en-US" sz="3200" dirty="0" err="1"/>
+              <a:t>donde</a:t>
+            </a:r>
+            <a:r>
+              <a:rPr lang="en-US" sz="3200" dirty="0"/>
+              <a:t> </a:t>
+            </a:r>
+            <a:r>
+              <a:rPr lang="en-US" sz="3200" dirty="0" err="1"/>
+              <a:t>los</a:t>
+            </a:r>
+            <a:r>
+              <a:rPr lang="en-US" sz="3200" dirty="0"/>
+              <a:t> </a:t>
+            </a:r>
+            <a:r>
+              <a:rPr lang="en-US" sz="3200" dirty="0" err="1"/>
+              <a:t>usuarios</a:t>
+            </a:r>
+            <a:r>
+              <a:rPr lang="en-US" sz="3200" dirty="0"/>
+              <a:t> </a:t>
+            </a:r>
+            <a:r>
+              <a:rPr lang="en-US" sz="3200" dirty="0" err="1"/>
+              <a:t>ingresen</a:t>
+            </a:r>
+            <a:r>
+              <a:rPr lang="en-US" sz="3200" dirty="0"/>
+              <a:t> </a:t>
+            </a:r>
+            <a:r>
+              <a:rPr lang="en-US" sz="3200" dirty="0" err="1"/>
+              <a:t>sus</a:t>
+            </a:r>
+            <a:r>
+              <a:rPr lang="en-US" sz="3200" dirty="0"/>
+              <a:t> </a:t>
+            </a:r>
+            <a:r>
+              <a:rPr lang="en-US" sz="3200" dirty="0" err="1"/>
+              <a:t>ofertas</a:t>
+            </a:r>
+            <a:r>
+              <a:rPr lang="en-US" sz="3200" dirty="0"/>
+              <a:t> de </a:t>
+            </a:r>
+            <a:r>
+              <a:rPr lang="en-US" sz="3200" dirty="0" err="1"/>
+              <a:t>libros</a:t>
+            </a:r>
+            <a:r>
+              <a:rPr lang="en-US" sz="3200" dirty="0"/>
+              <a:t> que </a:t>
+            </a:r>
+            <a:r>
+              <a:rPr lang="en-US" sz="3200" dirty="0" err="1"/>
+              <a:t>ya</a:t>
+            </a:r>
+            <a:r>
+              <a:rPr lang="en-US" sz="3200" dirty="0"/>
+              <a:t> no </a:t>
+            </a:r>
+            <a:r>
+              <a:rPr lang="en-US" sz="3200" dirty="0" err="1"/>
+              <a:t>utilicen</a:t>
+            </a:r>
+            <a:r>
+              <a:rPr lang="en-US" sz="3200" dirty="0"/>
+              <a:t> para </a:t>
+            </a:r>
+            <a:r>
+              <a:rPr lang="en-US" sz="3200" dirty="0" err="1"/>
+              <a:t>ser</a:t>
+            </a:r>
+            <a:r>
+              <a:rPr lang="en-US" sz="3200" dirty="0"/>
+              <a:t> </a:t>
+            </a:r>
+            <a:r>
+              <a:rPr lang="en-US" sz="3200" dirty="0" err="1"/>
+              <a:t>cambiados</a:t>
+            </a:r>
+            <a:endParaRPr lang="en-US" sz="3200" dirty="0"/>
           </a:p>
           <a:p>
             <a:pPr marL="571500" indent="-571500">
@@ -18303,425 +19163,45 @@
               <a:buChar char="•"/>
             </a:pPr>
             <a:r>
+              <a:rPr lang="en-US" sz="3200" dirty="0" err="1"/>
+              <a:t>Construir</a:t>
+            </a:r>
+            <a:r>
               <a:rPr lang="en-US" sz="3200" dirty="0"/>
-              <a:t>Train a model with the data to get an smart player</a:t>
-            </a:r>
-          </a:p>
-          <a:p>
-            <a:pPr marL="571500" indent="-571500">
-              <a:buFont typeface="Arial" panose="020B0604020202020204" pitchFamily="34" charset="0"/>
-              <a:buChar char="•"/>
-            </a:pPr>
+              <a:t> </a:t>
+            </a:r>
+            <a:r>
+              <a:rPr lang="en-US" sz="3200" dirty="0" err="1"/>
+              <a:t>una</a:t>
+            </a:r>
             <a:r>
               <a:rPr lang="en-US" sz="3200" dirty="0"/>
-              <a:t>Compare with another models and players</a:t>
-            </a:r>
-            <a:endParaRPr lang="en-US" sz="3600" dirty="0"/>
+              <a:t> </a:t>
+            </a:r>
+            <a:r>
+              <a:rPr lang="en-US" sz="3200" dirty="0" err="1"/>
+              <a:t>aplicación</a:t>
+            </a:r>
+            <a:r>
+              <a:rPr lang="en-US" sz="3200" dirty="0"/>
+              <a:t> </a:t>
+            </a:r>
+            <a:r>
+              <a:rPr lang="en-US" sz="3200" dirty="0" err="1"/>
+              <a:t>amigable</a:t>
+            </a:r>
+            <a:r>
+              <a:rPr lang="en-US" sz="3200" dirty="0"/>
+              <a:t> con el </a:t>
+            </a:r>
+            <a:r>
+              <a:rPr lang="en-US" sz="3200" dirty="0" err="1"/>
+              <a:t>usuario</a:t>
+            </a:r>
+            <a:endParaRPr lang="en-US" sz="3200" dirty="0"/>
           </a:p>
         </p:txBody>
       </p:sp>
-      <p:pic>
-        <p:nvPicPr>
-          <p:cNvPr id="25" name="Picture 24"/>
-          <p:cNvPicPr>
-            <a:picLocks noChangeAspect="1"/>
-          </p:cNvPicPr>
-          <p:nvPr/>
-        </p:nvPicPr>
-        <p:blipFill>
-          <a:blip r:embed="rId7" cstate="print">
-            <a:extLst>
-              <a:ext uri="{28A0092B-C50C-407E-A947-70E740481C1C}">
-                <a14:useLocalDpi xmlns:a14="http://schemas.microsoft.com/office/drawing/2010/main" val="0"/>
-              </a:ext>
-            </a:extLst>
-          </a:blip>
-          <a:stretch>
-            <a:fillRect/>
-          </a:stretch>
-        </p:blipFill>
-        <p:spPr>
-          <a:xfrm>
-            <a:off x="1042968" y="27215640"/>
-            <a:ext cx="13382936" cy="869272"/>
-          </a:xfrm>
-          <a:prstGeom prst="rect">
-            <a:avLst/>
-          </a:prstGeom>
-        </p:spPr>
-      </p:pic>
-      <p:pic>
-        <p:nvPicPr>
-          <p:cNvPr id="26" name="Picture 25"/>
-          <p:cNvPicPr>
-            <a:picLocks noChangeAspect="1"/>
-          </p:cNvPicPr>
-          <p:nvPr/>
-        </p:nvPicPr>
-        <p:blipFill>
-          <a:blip r:embed="rId8" cstate="print">
-            <a:extLst>
-              <a:ext uri="{28A0092B-C50C-407E-A947-70E740481C1C}">
-                <a14:useLocalDpi xmlns:a14="http://schemas.microsoft.com/office/drawing/2010/main" val="0"/>
-              </a:ext>
-            </a:extLst>
-          </a:blip>
-          <a:stretch>
-            <a:fillRect/>
-          </a:stretch>
-        </p:blipFill>
-        <p:spPr>
-          <a:xfrm>
-            <a:off x="1042968" y="25742054"/>
-            <a:ext cx="13382936" cy="869272"/>
-          </a:xfrm>
-          <a:prstGeom prst="rect">
-            <a:avLst/>
-          </a:prstGeom>
-        </p:spPr>
-      </p:pic>
-      <p:sp>
-        <p:nvSpPr>
-          <p:cNvPr id="49" name="TextBox 48"/>
-          <p:cNvSpPr txBox="1"/>
-          <p:nvPr/>
-        </p:nvSpPr>
-        <p:spPr>
-          <a:xfrm>
-            <a:off x="1219825" y="25217486"/>
-            <a:ext cx="2054473" cy="477054"/>
-          </a:xfrm>
-          <a:prstGeom prst="rect">
-            <a:avLst/>
-          </a:prstGeom>
-          <a:noFill/>
-        </p:spPr>
-        <p:txBody>
-          <a:bodyPr wrap="none" rtlCol="0">
-            <a:spAutoFit/>
-          </a:bodyPr>
-          <a:lstStyle/>
-          <a:p>
-            <a:r>
-              <a:rPr lang="en-US" sz="2500" dirty="0">
-                <a:latin typeface="Times New Roman" panose="02020603050405020304" pitchFamily="18" charset="0"/>
-                <a:cs typeface="Times New Roman" panose="02020603050405020304" pitchFamily="18" charset="0"/>
-              </a:rPr>
-              <a:t>Played Tokens</a:t>
-            </a:r>
-            <a:endParaRPr lang="es-CO" sz="2500" dirty="0">
-              <a:latin typeface="Times New Roman" panose="02020603050405020304" pitchFamily="18" charset="0"/>
-              <a:cs typeface="Times New Roman" panose="02020603050405020304" pitchFamily="18" charset="0"/>
-            </a:endParaRPr>
-          </a:p>
-        </p:txBody>
-      </p:sp>
-      <p:sp>
-        <p:nvSpPr>
-          <p:cNvPr id="50" name="TextBox 49"/>
-          <p:cNvSpPr txBox="1"/>
-          <p:nvPr/>
-        </p:nvSpPr>
-        <p:spPr>
-          <a:xfrm>
-            <a:off x="1219825" y="26704380"/>
-            <a:ext cx="1626471" cy="477054"/>
-          </a:xfrm>
-          <a:prstGeom prst="rect">
-            <a:avLst/>
-          </a:prstGeom>
-          <a:noFill/>
-        </p:spPr>
-        <p:txBody>
-          <a:bodyPr wrap="none" rtlCol="0">
-            <a:spAutoFit/>
-          </a:bodyPr>
-          <a:lstStyle/>
-          <a:p>
-            <a:r>
-              <a:rPr lang="en-US" sz="2500" dirty="0">
-                <a:latin typeface="Times New Roman" panose="02020603050405020304" pitchFamily="18" charset="0"/>
-                <a:cs typeface="Times New Roman" panose="02020603050405020304" pitchFamily="18" charset="0"/>
-              </a:rPr>
-              <a:t>My Tokens</a:t>
-            </a:r>
-            <a:endParaRPr lang="es-CO" sz="2500" dirty="0">
-              <a:latin typeface="Times New Roman" panose="02020603050405020304" pitchFamily="18" charset="0"/>
-              <a:cs typeface="Times New Roman" panose="02020603050405020304" pitchFamily="18" charset="0"/>
-            </a:endParaRPr>
-          </a:p>
-        </p:txBody>
-      </p:sp>
-      <p:sp>
-        <p:nvSpPr>
-          <p:cNvPr id="51" name="TextBox 50"/>
-          <p:cNvSpPr txBox="1"/>
-          <p:nvPr/>
-        </p:nvSpPr>
-        <p:spPr>
-          <a:xfrm>
-            <a:off x="1273316" y="28409604"/>
-            <a:ext cx="2660408" cy="861774"/>
-          </a:xfrm>
-          <a:prstGeom prst="rect">
-            <a:avLst/>
-          </a:prstGeom>
-          <a:noFill/>
-        </p:spPr>
-        <p:txBody>
-          <a:bodyPr wrap="none" rtlCol="0">
-            <a:spAutoFit/>
-          </a:bodyPr>
-          <a:lstStyle/>
-          <a:p>
-            <a:pPr algn="ctr"/>
-            <a:r>
-              <a:rPr lang="en-US" sz="2500" dirty="0">
-                <a:latin typeface="Times New Roman" panose="02020603050405020304" pitchFamily="18" charset="0"/>
-                <a:cs typeface="Times New Roman" panose="02020603050405020304" pitchFamily="18" charset="0"/>
-              </a:rPr>
-              <a:t>Number of Tokens </a:t>
-            </a:r>
-          </a:p>
-          <a:p>
-            <a:pPr algn="ctr"/>
-            <a:r>
-              <a:rPr lang="en-US" sz="2500" dirty="0">
-                <a:latin typeface="Times New Roman" panose="02020603050405020304" pitchFamily="18" charset="0"/>
-                <a:cs typeface="Times New Roman" panose="02020603050405020304" pitchFamily="18" charset="0"/>
-              </a:rPr>
-              <a:t>Opponent: 5</a:t>
-            </a:r>
-            <a:endParaRPr lang="es-CO" sz="2500" dirty="0">
-              <a:latin typeface="Times New Roman" panose="02020603050405020304" pitchFamily="18" charset="0"/>
-              <a:cs typeface="Times New Roman" panose="02020603050405020304" pitchFamily="18" charset="0"/>
-            </a:endParaRPr>
-          </a:p>
-        </p:txBody>
-      </p:sp>
-      <p:sp>
-        <p:nvSpPr>
-          <p:cNvPr id="52" name="TextBox 51"/>
-          <p:cNvSpPr txBox="1"/>
-          <p:nvPr/>
-        </p:nvSpPr>
-        <p:spPr>
-          <a:xfrm>
-            <a:off x="7326761" y="28505765"/>
-            <a:ext cx="898003" cy="477054"/>
-          </a:xfrm>
-          <a:prstGeom prst="rect">
-            <a:avLst/>
-          </a:prstGeom>
-          <a:noFill/>
-        </p:spPr>
-        <p:txBody>
-          <a:bodyPr wrap="none" rtlCol="0">
-            <a:spAutoFit/>
-          </a:bodyPr>
-          <a:lstStyle/>
-          <a:p>
-            <a:r>
-              <a:rPr lang="en-US" sz="2500" dirty="0">
-                <a:latin typeface="Times New Roman" panose="02020603050405020304" pitchFamily="18" charset="0"/>
-                <a:cs typeface="Times New Roman" panose="02020603050405020304" pitchFamily="18" charset="0"/>
-              </a:rPr>
-              <a:t>Right</a:t>
-            </a:r>
-            <a:endParaRPr lang="es-CO" sz="2500" dirty="0">
-              <a:latin typeface="Times New Roman" panose="02020603050405020304" pitchFamily="18" charset="0"/>
-              <a:cs typeface="Times New Roman" panose="02020603050405020304" pitchFamily="18" charset="0"/>
-            </a:endParaRPr>
-          </a:p>
-        </p:txBody>
-      </p:sp>
-      <p:sp>
-        <p:nvSpPr>
-          <p:cNvPr id="53" name="TextBox 52"/>
-          <p:cNvSpPr txBox="1"/>
-          <p:nvPr/>
-        </p:nvSpPr>
-        <p:spPr>
-          <a:xfrm>
-            <a:off x="4703122" y="28507802"/>
-            <a:ext cx="720069" cy="477054"/>
-          </a:xfrm>
-          <a:prstGeom prst="rect">
-            <a:avLst/>
-          </a:prstGeom>
-          <a:noFill/>
-        </p:spPr>
-        <p:txBody>
-          <a:bodyPr wrap="none" rtlCol="0">
-            <a:spAutoFit/>
-          </a:bodyPr>
-          <a:lstStyle/>
-          <a:p>
-            <a:r>
-              <a:rPr lang="en-US" sz="2500" dirty="0">
-                <a:latin typeface="Times New Roman" panose="02020603050405020304" pitchFamily="18" charset="0"/>
-                <a:cs typeface="Times New Roman" panose="02020603050405020304" pitchFamily="18" charset="0"/>
-              </a:rPr>
-              <a:t>Left</a:t>
-            </a:r>
-            <a:endParaRPr lang="es-CO" sz="2500" dirty="0">
-              <a:latin typeface="Times New Roman" panose="02020603050405020304" pitchFamily="18" charset="0"/>
-              <a:cs typeface="Times New Roman" panose="02020603050405020304" pitchFamily="18" charset="0"/>
-            </a:endParaRPr>
-          </a:p>
-        </p:txBody>
-      </p:sp>
-      <p:graphicFrame>
-        <p:nvGraphicFramePr>
-          <p:cNvPr id="31" name="Object 30"/>
-          <p:cNvGraphicFramePr>
-            <a:graphicFrameLocks noChangeAspect="1"/>
-          </p:cNvGraphicFramePr>
-          <p:nvPr>
-            <p:extLst>
-              <p:ext uri="{D42A27DB-BD31-4B8C-83A1-F6EECF244321}">
-                <p14:modId xmlns:p14="http://schemas.microsoft.com/office/powerpoint/2010/main" val="3629931247"/>
-              </p:ext>
-            </p:extLst>
-          </p:nvPr>
-        </p:nvGraphicFramePr>
-        <p:xfrm>
-          <a:off x="5607660" y="28410943"/>
-          <a:ext cx="857578" cy="841794"/>
-        </p:xfrm>
-        <a:graphic>
-          <a:graphicData uri="http://schemas.openxmlformats.org/presentationml/2006/ole">
-            <mc:AlternateContent xmlns:mc="http://schemas.openxmlformats.org/markup-compatibility/2006">
-              <mc:Choice xmlns:v="urn:schemas-microsoft-com:vml" Requires="v">
-                <p:oleObj spid="_x0000_s3101" name="Image" r:id="rId9" imgW="2069640" imgH="2031480" progId="Photoshop.Image.13">
-                  <p:embed/>
-                </p:oleObj>
-              </mc:Choice>
-              <mc:Fallback>
-                <p:oleObj name="Image" r:id="rId9" imgW="2069640" imgH="2031480" progId="Photoshop.Image.13">
-                  <p:embed/>
-                  <p:pic>
-                    <p:nvPicPr>
-                      <p:cNvPr id="0" name=""/>
-                      <p:cNvPicPr/>
-                      <p:nvPr/>
-                    </p:nvPicPr>
-                    <p:blipFill>
-                      <a:blip r:embed="rId10"/>
-                      <a:stretch>
-                        <a:fillRect/>
-                      </a:stretch>
-                    </p:blipFill>
-                    <p:spPr>
-                      <a:xfrm>
-                        <a:off x="5607660" y="28410943"/>
-                        <a:ext cx="857578" cy="841794"/>
-                      </a:xfrm>
-                      <a:prstGeom prst="rect">
-                        <a:avLst/>
-                      </a:prstGeom>
-                    </p:spPr>
-                  </p:pic>
-                </p:oleObj>
-              </mc:Fallback>
-            </mc:AlternateContent>
-          </a:graphicData>
-        </a:graphic>
-      </p:graphicFrame>
-      <p:sp>
-        <p:nvSpPr>
-          <p:cNvPr id="56" name="TextBox 55"/>
-          <p:cNvSpPr txBox="1"/>
-          <p:nvPr/>
-        </p:nvSpPr>
-        <p:spPr>
-          <a:xfrm>
-            <a:off x="10140206" y="28455183"/>
-            <a:ext cx="2246129" cy="477054"/>
-          </a:xfrm>
-          <a:prstGeom prst="rect">
-            <a:avLst/>
-          </a:prstGeom>
-          <a:noFill/>
-        </p:spPr>
-        <p:txBody>
-          <a:bodyPr wrap="none" rtlCol="0">
-            <a:spAutoFit/>
-          </a:bodyPr>
-          <a:lstStyle/>
-          <a:p>
-            <a:pPr algn="ctr"/>
-            <a:r>
-              <a:rPr lang="en-US" sz="2500" dirty="0">
-                <a:latin typeface="Times New Roman" panose="02020603050405020304" pitchFamily="18" charset="0"/>
-                <a:cs typeface="Times New Roman" panose="02020603050405020304" pitchFamily="18" charset="0"/>
-              </a:rPr>
-              <a:t>I’m the player 2</a:t>
-            </a:r>
-            <a:endParaRPr lang="es-CO" sz="2500" dirty="0">
-              <a:latin typeface="Times New Roman" panose="02020603050405020304" pitchFamily="18" charset="0"/>
-              <a:cs typeface="Times New Roman" panose="02020603050405020304" pitchFamily="18" charset="0"/>
-            </a:endParaRPr>
-          </a:p>
-        </p:txBody>
-      </p:sp>
-      <p:graphicFrame>
-        <p:nvGraphicFramePr>
-          <p:cNvPr id="35" name="Object 34"/>
-          <p:cNvGraphicFramePr>
-            <a:graphicFrameLocks noChangeAspect="1"/>
-          </p:cNvGraphicFramePr>
-          <p:nvPr>
-            <p:extLst>
-              <p:ext uri="{D42A27DB-BD31-4B8C-83A1-F6EECF244321}">
-                <p14:modId xmlns:p14="http://schemas.microsoft.com/office/powerpoint/2010/main" val="831331359"/>
-              </p:ext>
-            </p:extLst>
-          </p:nvPr>
-        </p:nvGraphicFramePr>
-        <p:xfrm>
-          <a:off x="8497582" y="28409604"/>
-          <a:ext cx="843133" cy="843133"/>
-        </p:xfrm>
-        <a:graphic>
-          <a:graphicData uri="http://schemas.openxmlformats.org/presentationml/2006/ole">
-            <mc:AlternateContent xmlns:mc="http://schemas.openxmlformats.org/markup-compatibility/2006">
-              <mc:Choice xmlns:v="urn:schemas-microsoft-com:vml" Requires="v">
-                <p:oleObj spid="_x0000_s3102" name="Image" r:id="rId11" imgW="2031480" imgH="2031480" progId="Photoshop.Image.13">
-                  <p:embed/>
-                </p:oleObj>
-              </mc:Choice>
-              <mc:Fallback>
-                <p:oleObj name="Image" r:id="rId11" imgW="2031480" imgH="2031480" progId="Photoshop.Image.13">
-                  <p:embed/>
-                  <p:pic>
-                    <p:nvPicPr>
-                      <p:cNvPr id="0" name=""/>
-                      <p:cNvPicPr/>
-                      <p:nvPr/>
-                    </p:nvPicPr>
-                    <p:blipFill>
-                      <a:blip r:embed="rId12"/>
-                      <a:stretch>
-                        <a:fillRect/>
-                      </a:stretch>
-                    </p:blipFill>
-                    <p:spPr>
-                      <a:xfrm>
-                        <a:off x="8497582" y="28409604"/>
-                        <a:ext cx="843133" cy="843133"/>
-                      </a:xfrm>
-                      <a:prstGeom prst="rect">
-                        <a:avLst/>
-                      </a:prstGeom>
-                    </p:spPr>
-                  </p:pic>
-                </p:oleObj>
-              </mc:Fallback>
-            </mc:AlternateContent>
-          </a:graphicData>
-        </a:graphic>
-      </p:graphicFrame>
       <p:sp>
         <p:nvSpPr>
           <p:cNvPr id="60" name="TextBox 59"/>
@@ -18730,8 +19210,8 @@
         </p:nvSpPr>
         <p:spPr>
           <a:xfrm>
-            <a:off x="10741787" y="30148487"/>
-            <a:ext cx="3684117" cy="3539430"/>
+            <a:off x="1040822" y="22440131"/>
+            <a:ext cx="13229331" cy="1200329"/>
           </a:xfrm>
           <a:prstGeom prst="rect">
             <a:avLst/>
@@ -18744,8 +19224,12 @@
           </a:bodyPr>
           <a:lstStyle/>
           <a:p>
-            <a:r>
-              <a:rPr lang="en-US" sz="3200" dirty="0">
+            <a:pPr marL="457200" indent="-457200">
+              <a:buFont typeface="Arial" panose="020B0604020202020204" pitchFamily="34" charset="0"/>
+              <a:buChar char="•"/>
+            </a:pPr>
+            <a:r>
+              <a:rPr lang="en-US" sz="3600" dirty="0">
                 <a:solidFill>
                   <a:schemeClr val="accent5">
                     <a:lumMod val="50000"/>
@@ -18754,9 +19238,309 @@
                 <a:latin typeface="Times New Roman" panose="02020603050405020304" pitchFamily="18" charset="0"/>
                 <a:cs typeface="Times New Roman" panose="02020603050405020304" pitchFamily="18" charset="0"/>
               </a:rPr>
-              <a:t>The random player is a legal player whom strategy is just to choose randomly one of the possible moves it can make in a turn </a:t>
-            </a:r>
-            <a:endParaRPr lang="es-CO" sz="3200" dirty="0">
+              <a:t>Login y </a:t>
+            </a:r>
+            <a:r>
+              <a:rPr lang="en-US" sz="3600" dirty="0" err="1">
+                <a:solidFill>
+                  <a:schemeClr val="accent5">
+                    <a:lumMod val="50000"/>
+                  </a:schemeClr>
+                </a:solidFill>
+                <a:latin typeface="Times New Roman" panose="02020603050405020304" pitchFamily="18" charset="0"/>
+                <a:cs typeface="Times New Roman" panose="02020603050405020304" pitchFamily="18" charset="0"/>
+              </a:rPr>
+              <a:t>registro</a:t>
+            </a:r>
+            <a:r>
+              <a:rPr lang="en-US" sz="3600" dirty="0">
+                <a:solidFill>
+                  <a:schemeClr val="accent5">
+                    <a:lumMod val="50000"/>
+                  </a:schemeClr>
+                </a:solidFill>
+                <a:latin typeface="Times New Roman" panose="02020603050405020304" pitchFamily="18" charset="0"/>
+                <a:cs typeface="Times New Roman" panose="02020603050405020304" pitchFamily="18" charset="0"/>
+              </a:rPr>
+              <a:t>: la persona </a:t>
+            </a:r>
+            <a:r>
+              <a:rPr lang="en-US" sz="3600" dirty="0" err="1">
+                <a:solidFill>
+                  <a:schemeClr val="accent5">
+                    <a:lumMod val="50000"/>
+                  </a:schemeClr>
+                </a:solidFill>
+                <a:latin typeface="Times New Roman" panose="02020603050405020304" pitchFamily="18" charset="0"/>
+                <a:cs typeface="Times New Roman" panose="02020603050405020304" pitchFamily="18" charset="0"/>
+              </a:rPr>
+              <a:t>debe</a:t>
+            </a:r>
+            <a:r>
+              <a:rPr lang="en-US" sz="3600" dirty="0">
+                <a:solidFill>
+                  <a:schemeClr val="accent5">
+                    <a:lumMod val="50000"/>
+                  </a:schemeClr>
+                </a:solidFill>
+                <a:latin typeface="Times New Roman" panose="02020603050405020304" pitchFamily="18" charset="0"/>
+                <a:cs typeface="Times New Roman" panose="02020603050405020304" pitchFamily="18" charset="0"/>
+              </a:rPr>
+              <a:t> </a:t>
+            </a:r>
+            <a:r>
+              <a:rPr lang="en-US" sz="3600" dirty="0" err="1">
+                <a:solidFill>
+                  <a:schemeClr val="accent5">
+                    <a:lumMod val="50000"/>
+                  </a:schemeClr>
+                </a:solidFill>
+                <a:latin typeface="Times New Roman" panose="02020603050405020304" pitchFamily="18" charset="0"/>
+                <a:cs typeface="Times New Roman" panose="02020603050405020304" pitchFamily="18" charset="0"/>
+              </a:rPr>
+              <a:t>tener</a:t>
+            </a:r>
+            <a:r>
+              <a:rPr lang="en-US" sz="3600" dirty="0">
+                <a:solidFill>
+                  <a:schemeClr val="accent5">
+                    <a:lumMod val="50000"/>
+                  </a:schemeClr>
+                </a:solidFill>
+                <a:latin typeface="Times New Roman" panose="02020603050405020304" pitchFamily="18" charset="0"/>
+                <a:cs typeface="Times New Roman" panose="02020603050405020304" pitchFamily="18" charset="0"/>
+              </a:rPr>
+              <a:t> un </a:t>
+            </a:r>
+            <a:r>
+              <a:rPr lang="en-US" sz="3600" dirty="0" err="1">
+                <a:solidFill>
+                  <a:schemeClr val="accent5">
+                    <a:lumMod val="50000"/>
+                  </a:schemeClr>
+                </a:solidFill>
+                <a:latin typeface="Times New Roman" panose="02020603050405020304" pitchFamily="18" charset="0"/>
+                <a:cs typeface="Times New Roman" panose="02020603050405020304" pitchFamily="18" charset="0"/>
+              </a:rPr>
+              <a:t>usuario</a:t>
+            </a:r>
+            <a:r>
+              <a:rPr lang="en-US" sz="3600" dirty="0">
+                <a:solidFill>
+                  <a:schemeClr val="accent5">
+                    <a:lumMod val="50000"/>
+                  </a:schemeClr>
+                </a:solidFill>
+                <a:latin typeface="Times New Roman" panose="02020603050405020304" pitchFamily="18" charset="0"/>
+                <a:cs typeface="Times New Roman" panose="02020603050405020304" pitchFamily="18" charset="0"/>
+              </a:rPr>
+              <a:t> para </a:t>
+            </a:r>
+            <a:r>
+              <a:rPr lang="en-US" sz="3600" dirty="0" err="1">
+                <a:solidFill>
+                  <a:schemeClr val="accent5">
+                    <a:lumMod val="50000"/>
+                  </a:schemeClr>
+                </a:solidFill>
+                <a:latin typeface="Times New Roman" panose="02020603050405020304" pitchFamily="18" charset="0"/>
+                <a:cs typeface="Times New Roman" panose="02020603050405020304" pitchFamily="18" charset="0"/>
+              </a:rPr>
+              <a:t>llogearse</a:t>
+            </a:r>
+            <a:r>
+              <a:rPr lang="en-US" sz="3600" dirty="0">
+                <a:solidFill>
+                  <a:schemeClr val="accent5">
+                    <a:lumMod val="50000"/>
+                  </a:schemeClr>
+                </a:solidFill>
+                <a:latin typeface="Times New Roman" panose="02020603050405020304" pitchFamily="18" charset="0"/>
+                <a:cs typeface="Times New Roman" panose="02020603050405020304" pitchFamily="18" charset="0"/>
+              </a:rPr>
+              <a:t> </a:t>
+            </a:r>
+            <a:r>
+              <a:rPr lang="en-US" sz="3600" dirty="0" err="1">
+                <a:solidFill>
+                  <a:schemeClr val="accent5">
+                    <a:lumMod val="50000"/>
+                  </a:schemeClr>
+                </a:solidFill>
+                <a:latin typeface="Times New Roman" panose="02020603050405020304" pitchFamily="18" charset="0"/>
+                <a:cs typeface="Times New Roman" panose="02020603050405020304" pitchFamily="18" charset="0"/>
+              </a:rPr>
+              <a:t>en</a:t>
+            </a:r>
+            <a:r>
+              <a:rPr lang="en-US" sz="3600" dirty="0">
+                <a:solidFill>
+                  <a:schemeClr val="accent5">
+                    <a:lumMod val="50000"/>
+                  </a:schemeClr>
+                </a:solidFill>
+                <a:latin typeface="Times New Roman" panose="02020603050405020304" pitchFamily="18" charset="0"/>
+                <a:cs typeface="Times New Roman" panose="02020603050405020304" pitchFamily="18" charset="0"/>
+              </a:rPr>
+              <a:t> la </a:t>
+            </a:r>
+            <a:r>
+              <a:rPr lang="en-US" sz="3600" dirty="0" err="1">
+                <a:solidFill>
+                  <a:schemeClr val="accent5">
+                    <a:lumMod val="50000"/>
+                  </a:schemeClr>
+                </a:solidFill>
+                <a:latin typeface="Times New Roman" panose="02020603050405020304" pitchFamily="18" charset="0"/>
+                <a:cs typeface="Times New Roman" panose="02020603050405020304" pitchFamily="18" charset="0"/>
+              </a:rPr>
+              <a:t>aplciación</a:t>
+            </a:r>
+            <a:r>
+              <a:rPr lang="en-US" sz="3600" dirty="0">
+                <a:solidFill>
+                  <a:schemeClr val="accent5">
+                    <a:lumMod val="50000"/>
+                  </a:schemeClr>
+                </a:solidFill>
+                <a:latin typeface="Times New Roman" panose="02020603050405020304" pitchFamily="18" charset="0"/>
+                <a:cs typeface="Times New Roman" panose="02020603050405020304" pitchFamily="18" charset="0"/>
+              </a:rPr>
+              <a:t>, </a:t>
+            </a:r>
+            <a:r>
+              <a:rPr lang="en-US" sz="3600" dirty="0" err="1">
+                <a:solidFill>
+                  <a:schemeClr val="accent5">
+                    <a:lumMod val="50000"/>
+                  </a:schemeClr>
+                </a:solidFill>
+                <a:latin typeface="Times New Roman" panose="02020603050405020304" pitchFamily="18" charset="0"/>
+                <a:cs typeface="Times New Roman" panose="02020603050405020304" pitchFamily="18" charset="0"/>
+              </a:rPr>
+              <a:t>en</a:t>
+            </a:r>
+            <a:r>
+              <a:rPr lang="en-US" sz="3600" dirty="0">
+                <a:solidFill>
+                  <a:schemeClr val="accent5">
+                    <a:lumMod val="50000"/>
+                  </a:schemeClr>
+                </a:solidFill>
+                <a:latin typeface="Times New Roman" panose="02020603050405020304" pitchFamily="18" charset="0"/>
+                <a:cs typeface="Times New Roman" panose="02020603050405020304" pitchFamily="18" charset="0"/>
+              </a:rPr>
+              <a:t> </a:t>
+            </a:r>
+            <a:r>
+              <a:rPr lang="en-US" sz="3600" dirty="0" err="1">
+                <a:solidFill>
+                  <a:schemeClr val="accent5">
+                    <a:lumMod val="50000"/>
+                  </a:schemeClr>
+                </a:solidFill>
+                <a:latin typeface="Times New Roman" panose="02020603050405020304" pitchFamily="18" charset="0"/>
+                <a:cs typeface="Times New Roman" panose="02020603050405020304" pitchFamily="18" charset="0"/>
+              </a:rPr>
+              <a:t>caso</a:t>
+            </a:r>
+            <a:r>
+              <a:rPr lang="en-US" sz="3600" dirty="0">
+                <a:solidFill>
+                  <a:schemeClr val="accent5">
+                    <a:lumMod val="50000"/>
+                  </a:schemeClr>
+                </a:solidFill>
+                <a:latin typeface="Times New Roman" panose="02020603050405020304" pitchFamily="18" charset="0"/>
+                <a:cs typeface="Times New Roman" panose="02020603050405020304" pitchFamily="18" charset="0"/>
+              </a:rPr>
+              <a:t> de no </a:t>
+            </a:r>
+            <a:r>
+              <a:rPr lang="en-US" sz="3600" dirty="0" err="1">
+                <a:solidFill>
+                  <a:schemeClr val="accent5">
+                    <a:lumMod val="50000"/>
+                  </a:schemeClr>
+                </a:solidFill>
+                <a:latin typeface="Times New Roman" panose="02020603050405020304" pitchFamily="18" charset="0"/>
+                <a:cs typeface="Times New Roman" panose="02020603050405020304" pitchFamily="18" charset="0"/>
+              </a:rPr>
+              <a:t>tenerlo</a:t>
+            </a:r>
+            <a:r>
+              <a:rPr lang="en-US" sz="3600" dirty="0">
+                <a:solidFill>
+                  <a:schemeClr val="accent5">
+                    <a:lumMod val="50000"/>
+                  </a:schemeClr>
+                </a:solidFill>
+                <a:latin typeface="Times New Roman" panose="02020603050405020304" pitchFamily="18" charset="0"/>
+                <a:cs typeface="Times New Roman" panose="02020603050405020304" pitchFamily="18" charset="0"/>
+              </a:rPr>
+              <a:t> </a:t>
+            </a:r>
+            <a:r>
+              <a:rPr lang="en-US" sz="3600" dirty="0" err="1">
+                <a:solidFill>
+                  <a:schemeClr val="accent5">
+                    <a:lumMod val="50000"/>
+                  </a:schemeClr>
+                </a:solidFill>
+                <a:latin typeface="Times New Roman" panose="02020603050405020304" pitchFamily="18" charset="0"/>
+                <a:cs typeface="Times New Roman" panose="02020603050405020304" pitchFamily="18" charset="0"/>
+              </a:rPr>
+              <a:t>puede</a:t>
+            </a:r>
+            <a:r>
+              <a:rPr lang="en-US" sz="3600" dirty="0">
+                <a:solidFill>
+                  <a:schemeClr val="accent5">
+                    <a:lumMod val="50000"/>
+                  </a:schemeClr>
+                </a:solidFill>
+                <a:latin typeface="Times New Roman" panose="02020603050405020304" pitchFamily="18" charset="0"/>
+                <a:cs typeface="Times New Roman" panose="02020603050405020304" pitchFamily="18" charset="0"/>
+              </a:rPr>
+              <a:t> </a:t>
+            </a:r>
+            <a:r>
+              <a:rPr lang="en-US" sz="3600" dirty="0" err="1">
+                <a:solidFill>
+                  <a:schemeClr val="accent5">
+                    <a:lumMod val="50000"/>
+                  </a:schemeClr>
+                </a:solidFill>
+                <a:latin typeface="Times New Roman" panose="02020603050405020304" pitchFamily="18" charset="0"/>
+                <a:cs typeface="Times New Roman" panose="02020603050405020304" pitchFamily="18" charset="0"/>
+              </a:rPr>
+              <a:t>registrarse</a:t>
+            </a:r>
+            <a:r>
+              <a:rPr lang="en-US" sz="3600" dirty="0">
+                <a:solidFill>
+                  <a:schemeClr val="accent5">
+                    <a:lumMod val="50000"/>
+                  </a:schemeClr>
+                </a:solidFill>
+                <a:latin typeface="Times New Roman" panose="02020603050405020304" pitchFamily="18" charset="0"/>
+                <a:cs typeface="Times New Roman" panose="02020603050405020304" pitchFamily="18" charset="0"/>
+              </a:rPr>
+              <a:t> para </a:t>
+            </a:r>
+            <a:r>
+              <a:rPr lang="en-US" sz="3600" dirty="0" err="1">
+                <a:solidFill>
+                  <a:schemeClr val="accent5">
+                    <a:lumMod val="50000"/>
+                  </a:schemeClr>
+                </a:solidFill>
+                <a:latin typeface="Times New Roman" panose="02020603050405020304" pitchFamily="18" charset="0"/>
+                <a:cs typeface="Times New Roman" panose="02020603050405020304" pitchFamily="18" charset="0"/>
+              </a:rPr>
+              <a:t>tenerlo</a:t>
+            </a:r>
+            <a:endParaRPr lang="es-CO" sz="3600" dirty="0">
               <a:solidFill>
                 <a:schemeClr val="accent5">
                   <a:lumMod val="50000"/>
@@ -18824,8 +19608,8 @@
         </p:nvSpPr>
         <p:spPr>
           <a:xfrm>
-            <a:off x="1379039" y="35856070"/>
-            <a:ext cx="3684117" cy="4031873"/>
+            <a:off x="1097198" y="32104821"/>
+            <a:ext cx="13172955" cy="1754326"/>
           </a:xfrm>
           <a:prstGeom prst="rect">
             <a:avLst/>
@@ -18838,9 +19622,12 @@
           </a:bodyPr>
           <a:lstStyle/>
           <a:p>
-            <a:pPr algn="r"/>
-            <a:r>
-              <a:rPr lang="en-US" sz="3200" dirty="0">
+            <a:pPr marL="571500" indent="-571500">
+              <a:buFont typeface="Arial" panose="020B0604020202020204" pitchFamily="34" charset="0"/>
+              <a:buChar char="•"/>
+            </a:pPr>
+            <a:r>
+              <a:rPr lang="en-US" sz="3600" dirty="0" err="1">
                 <a:solidFill>
                   <a:schemeClr val="accent5">
                     <a:lumMod val="50000"/>
@@ -18849,9 +19636,393 @@
                 <a:latin typeface="Times New Roman" panose="02020603050405020304" pitchFamily="18" charset="0"/>
                 <a:cs typeface="Times New Roman" panose="02020603050405020304" pitchFamily="18" charset="0"/>
               </a:rPr>
-              <a:t>The smart player is a cheater player who can see the complete state of a game and uses an alpha-beta search to decide which action take in each turn</a:t>
-            </a:r>
-            <a:endParaRPr lang="es-CO" sz="3200" dirty="0">
+              <a:t>Perfil</a:t>
+            </a:r>
+            <a:r>
+              <a:rPr lang="en-US" sz="3600" dirty="0">
+                <a:solidFill>
+                  <a:schemeClr val="accent5">
+                    <a:lumMod val="50000"/>
+                  </a:schemeClr>
+                </a:solidFill>
+                <a:latin typeface="Times New Roman" panose="02020603050405020304" pitchFamily="18" charset="0"/>
+                <a:cs typeface="Times New Roman" panose="02020603050405020304" pitchFamily="18" charset="0"/>
+              </a:rPr>
+              <a:t> de </a:t>
+            </a:r>
+            <a:r>
+              <a:rPr lang="en-US" sz="3600" dirty="0" err="1">
+                <a:solidFill>
+                  <a:schemeClr val="accent5">
+                    <a:lumMod val="50000"/>
+                  </a:schemeClr>
+                </a:solidFill>
+                <a:latin typeface="Times New Roman" panose="02020603050405020304" pitchFamily="18" charset="0"/>
+                <a:cs typeface="Times New Roman" panose="02020603050405020304" pitchFamily="18" charset="0"/>
+              </a:rPr>
+              <a:t>Usuario</a:t>
+            </a:r>
+            <a:r>
+              <a:rPr lang="en-US" sz="3600" dirty="0">
+                <a:solidFill>
+                  <a:schemeClr val="accent5">
+                    <a:lumMod val="50000"/>
+                  </a:schemeClr>
+                </a:solidFill>
+                <a:latin typeface="Times New Roman" panose="02020603050405020304" pitchFamily="18" charset="0"/>
+                <a:cs typeface="Times New Roman" panose="02020603050405020304" pitchFamily="18" charset="0"/>
+              </a:rPr>
+              <a:t>: El </a:t>
+            </a:r>
+            <a:r>
+              <a:rPr lang="en-US" sz="3600" dirty="0" err="1">
+                <a:solidFill>
+                  <a:schemeClr val="accent5">
+                    <a:lumMod val="50000"/>
+                  </a:schemeClr>
+                </a:solidFill>
+                <a:latin typeface="Times New Roman" panose="02020603050405020304" pitchFamily="18" charset="0"/>
+                <a:cs typeface="Times New Roman" panose="02020603050405020304" pitchFamily="18" charset="0"/>
+              </a:rPr>
+              <a:t>usuario</a:t>
+            </a:r>
+            <a:r>
+              <a:rPr lang="en-US" sz="3600" dirty="0">
+                <a:solidFill>
+                  <a:schemeClr val="accent5">
+                    <a:lumMod val="50000"/>
+                  </a:schemeClr>
+                </a:solidFill>
+                <a:latin typeface="Times New Roman" panose="02020603050405020304" pitchFamily="18" charset="0"/>
+                <a:cs typeface="Times New Roman" panose="02020603050405020304" pitchFamily="18" charset="0"/>
+              </a:rPr>
+              <a:t> </a:t>
+            </a:r>
+            <a:r>
+              <a:rPr lang="en-US" sz="3600" dirty="0" err="1">
+                <a:solidFill>
+                  <a:schemeClr val="accent5">
+                    <a:lumMod val="50000"/>
+                  </a:schemeClr>
+                </a:solidFill>
+                <a:latin typeface="Times New Roman" panose="02020603050405020304" pitchFamily="18" charset="0"/>
+                <a:cs typeface="Times New Roman" panose="02020603050405020304" pitchFamily="18" charset="0"/>
+              </a:rPr>
+              <a:t>tiene</a:t>
+            </a:r>
+            <a:r>
+              <a:rPr lang="en-US" sz="3600" dirty="0">
+                <a:solidFill>
+                  <a:schemeClr val="accent5">
+                    <a:lumMod val="50000"/>
+                  </a:schemeClr>
+                </a:solidFill>
+                <a:latin typeface="Times New Roman" panose="02020603050405020304" pitchFamily="18" charset="0"/>
+                <a:cs typeface="Times New Roman" panose="02020603050405020304" pitchFamily="18" charset="0"/>
+              </a:rPr>
+              <a:t> </a:t>
+            </a:r>
+            <a:r>
+              <a:rPr lang="en-US" sz="3600" dirty="0" err="1">
+                <a:solidFill>
+                  <a:schemeClr val="accent5">
+                    <a:lumMod val="50000"/>
+                  </a:schemeClr>
+                </a:solidFill>
+                <a:latin typeface="Times New Roman" panose="02020603050405020304" pitchFamily="18" charset="0"/>
+                <a:cs typeface="Times New Roman" panose="02020603050405020304" pitchFamily="18" charset="0"/>
+              </a:rPr>
+              <a:t>una</a:t>
+            </a:r>
+            <a:r>
+              <a:rPr lang="en-US" sz="3600" dirty="0">
+                <a:solidFill>
+                  <a:schemeClr val="accent5">
+                    <a:lumMod val="50000"/>
+                  </a:schemeClr>
+                </a:solidFill>
+                <a:latin typeface="Times New Roman" panose="02020603050405020304" pitchFamily="18" charset="0"/>
+                <a:cs typeface="Times New Roman" panose="02020603050405020304" pitchFamily="18" charset="0"/>
+              </a:rPr>
+              <a:t> </a:t>
+            </a:r>
+            <a:r>
+              <a:rPr lang="en-US" sz="3600" dirty="0" err="1">
+                <a:solidFill>
+                  <a:schemeClr val="accent5">
+                    <a:lumMod val="50000"/>
+                  </a:schemeClr>
+                </a:solidFill>
+                <a:latin typeface="Times New Roman" panose="02020603050405020304" pitchFamily="18" charset="0"/>
+                <a:cs typeface="Times New Roman" panose="02020603050405020304" pitchFamily="18" charset="0"/>
+              </a:rPr>
+              <a:t>información</a:t>
+            </a:r>
+            <a:r>
+              <a:rPr lang="en-US" sz="3600" dirty="0">
+                <a:solidFill>
+                  <a:schemeClr val="accent5">
+                    <a:lumMod val="50000"/>
+                  </a:schemeClr>
+                </a:solidFill>
+                <a:latin typeface="Times New Roman" panose="02020603050405020304" pitchFamily="18" charset="0"/>
+                <a:cs typeface="Times New Roman" panose="02020603050405020304" pitchFamily="18" charset="0"/>
+              </a:rPr>
+              <a:t> general que  </a:t>
+            </a:r>
+            <a:r>
+              <a:rPr lang="en-US" sz="3600" dirty="0" err="1">
+                <a:solidFill>
+                  <a:schemeClr val="accent5">
+                    <a:lumMod val="50000"/>
+                  </a:schemeClr>
+                </a:solidFill>
+                <a:latin typeface="Times New Roman" panose="02020603050405020304" pitchFamily="18" charset="0"/>
+                <a:cs typeface="Times New Roman" panose="02020603050405020304" pitchFamily="18" charset="0"/>
+              </a:rPr>
+              <a:t>comparte</a:t>
+            </a:r>
+            <a:r>
+              <a:rPr lang="en-US" sz="3600" dirty="0">
+                <a:solidFill>
+                  <a:schemeClr val="accent5">
+                    <a:lumMod val="50000"/>
+                  </a:schemeClr>
+                </a:solidFill>
+                <a:latin typeface="Times New Roman" panose="02020603050405020304" pitchFamily="18" charset="0"/>
+                <a:cs typeface="Times New Roman" panose="02020603050405020304" pitchFamily="18" charset="0"/>
+              </a:rPr>
+              <a:t> con </a:t>
+            </a:r>
+            <a:r>
+              <a:rPr lang="en-US" sz="3600" dirty="0" err="1">
+                <a:solidFill>
+                  <a:schemeClr val="accent5">
+                    <a:lumMod val="50000"/>
+                  </a:schemeClr>
+                </a:solidFill>
+                <a:latin typeface="Times New Roman" panose="02020603050405020304" pitchFamily="18" charset="0"/>
+                <a:cs typeface="Times New Roman" panose="02020603050405020304" pitchFamily="18" charset="0"/>
+              </a:rPr>
+              <a:t>los</a:t>
+            </a:r>
+            <a:r>
+              <a:rPr lang="en-US" sz="3600" dirty="0">
+                <a:solidFill>
+                  <a:schemeClr val="accent5">
+                    <a:lumMod val="50000"/>
+                  </a:schemeClr>
+                </a:solidFill>
+                <a:latin typeface="Times New Roman" panose="02020603050405020304" pitchFamily="18" charset="0"/>
+                <a:cs typeface="Times New Roman" panose="02020603050405020304" pitchFamily="18" charset="0"/>
+              </a:rPr>
+              <a:t> </a:t>
+            </a:r>
+            <a:r>
+              <a:rPr lang="en-US" sz="3600" dirty="0" err="1">
+                <a:solidFill>
+                  <a:schemeClr val="accent5">
+                    <a:lumMod val="50000"/>
+                  </a:schemeClr>
+                </a:solidFill>
+                <a:latin typeface="Times New Roman" panose="02020603050405020304" pitchFamily="18" charset="0"/>
+                <a:cs typeface="Times New Roman" panose="02020603050405020304" pitchFamily="18" charset="0"/>
+              </a:rPr>
+              <a:t>demás</a:t>
+            </a:r>
+            <a:r>
+              <a:rPr lang="en-US" sz="3600" dirty="0">
+                <a:solidFill>
+                  <a:schemeClr val="accent5">
+                    <a:lumMod val="50000"/>
+                  </a:schemeClr>
+                </a:solidFill>
+                <a:latin typeface="Times New Roman" panose="02020603050405020304" pitchFamily="18" charset="0"/>
+                <a:cs typeface="Times New Roman" panose="02020603050405020304" pitchFamily="18" charset="0"/>
+              </a:rPr>
+              <a:t> </a:t>
+            </a:r>
+            <a:r>
+              <a:rPr lang="en-US" sz="3600" dirty="0" err="1">
+                <a:solidFill>
+                  <a:schemeClr val="accent5">
+                    <a:lumMod val="50000"/>
+                  </a:schemeClr>
+                </a:solidFill>
+                <a:latin typeface="Times New Roman" panose="02020603050405020304" pitchFamily="18" charset="0"/>
+                <a:cs typeface="Times New Roman" panose="02020603050405020304" pitchFamily="18" charset="0"/>
+              </a:rPr>
+              <a:t>usuarios</a:t>
+            </a:r>
+            <a:r>
+              <a:rPr lang="en-US" sz="3600" dirty="0">
+                <a:solidFill>
+                  <a:schemeClr val="accent5">
+                    <a:lumMod val="50000"/>
+                  </a:schemeClr>
+                </a:solidFill>
+                <a:latin typeface="Times New Roman" panose="02020603050405020304" pitchFamily="18" charset="0"/>
+                <a:cs typeface="Times New Roman" panose="02020603050405020304" pitchFamily="18" charset="0"/>
+              </a:rPr>
+              <a:t>, </a:t>
+            </a:r>
+            <a:r>
+              <a:rPr lang="en-US" sz="3600" dirty="0" err="1">
+                <a:solidFill>
+                  <a:schemeClr val="accent5">
+                    <a:lumMod val="50000"/>
+                  </a:schemeClr>
+                </a:solidFill>
+                <a:latin typeface="Times New Roman" panose="02020603050405020304" pitchFamily="18" charset="0"/>
+                <a:cs typeface="Times New Roman" panose="02020603050405020304" pitchFamily="18" charset="0"/>
+              </a:rPr>
+              <a:t>esta</a:t>
+            </a:r>
+            <a:r>
+              <a:rPr lang="en-US" sz="3600" dirty="0">
+                <a:solidFill>
+                  <a:schemeClr val="accent5">
+                    <a:lumMod val="50000"/>
+                  </a:schemeClr>
+                </a:solidFill>
+                <a:latin typeface="Times New Roman" panose="02020603050405020304" pitchFamily="18" charset="0"/>
+                <a:cs typeface="Times New Roman" panose="02020603050405020304" pitchFamily="18" charset="0"/>
+              </a:rPr>
+              <a:t> </a:t>
+            </a:r>
+            <a:r>
+              <a:rPr lang="en-US" sz="3600" dirty="0" err="1">
+                <a:solidFill>
+                  <a:schemeClr val="accent5">
+                    <a:lumMod val="50000"/>
+                  </a:schemeClr>
+                </a:solidFill>
+                <a:latin typeface="Times New Roman" panose="02020603050405020304" pitchFamily="18" charset="0"/>
+                <a:cs typeface="Times New Roman" panose="02020603050405020304" pitchFamily="18" charset="0"/>
+              </a:rPr>
+              <a:t>información</a:t>
+            </a:r>
+            <a:r>
+              <a:rPr lang="en-US" sz="3600" dirty="0">
+                <a:solidFill>
+                  <a:schemeClr val="accent5">
+                    <a:lumMod val="50000"/>
+                  </a:schemeClr>
+                </a:solidFill>
+                <a:latin typeface="Times New Roman" panose="02020603050405020304" pitchFamily="18" charset="0"/>
+                <a:cs typeface="Times New Roman" panose="02020603050405020304" pitchFamily="18" charset="0"/>
+              </a:rPr>
+              <a:t> el </a:t>
+            </a:r>
+            <a:r>
+              <a:rPr lang="en-US" sz="3600" dirty="0" err="1">
+                <a:solidFill>
+                  <a:schemeClr val="accent5">
+                    <a:lumMod val="50000"/>
+                  </a:schemeClr>
+                </a:solidFill>
+                <a:latin typeface="Times New Roman" panose="02020603050405020304" pitchFamily="18" charset="0"/>
+                <a:cs typeface="Times New Roman" panose="02020603050405020304" pitchFamily="18" charset="0"/>
+              </a:rPr>
+              <a:t>usuario</a:t>
+            </a:r>
+            <a:r>
+              <a:rPr lang="en-US" sz="3600" dirty="0">
+                <a:solidFill>
+                  <a:schemeClr val="accent5">
+                    <a:lumMod val="50000"/>
+                  </a:schemeClr>
+                </a:solidFill>
+                <a:latin typeface="Times New Roman" panose="02020603050405020304" pitchFamily="18" charset="0"/>
+                <a:cs typeface="Times New Roman" panose="02020603050405020304" pitchFamily="18" charset="0"/>
+              </a:rPr>
+              <a:t> la </a:t>
+            </a:r>
+            <a:r>
+              <a:rPr lang="en-US" sz="3600" dirty="0" err="1">
+                <a:solidFill>
+                  <a:schemeClr val="accent5">
+                    <a:lumMod val="50000"/>
+                  </a:schemeClr>
+                </a:solidFill>
+                <a:latin typeface="Times New Roman" panose="02020603050405020304" pitchFamily="18" charset="0"/>
+                <a:cs typeface="Times New Roman" panose="02020603050405020304" pitchFamily="18" charset="0"/>
+              </a:rPr>
+              <a:t>puede</a:t>
+            </a:r>
+            <a:r>
+              <a:rPr lang="en-US" sz="3600" dirty="0">
+                <a:solidFill>
+                  <a:schemeClr val="accent5">
+                    <a:lumMod val="50000"/>
+                  </a:schemeClr>
+                </a:solidFill>
+                <a:latin typeface="Times New Roman" panose="02020603050405020304" pitchFamily="18" charset="0"/>
+                <a:cs typeface="Times New Roman" panose="02020603050405020304" pitchFamily="18" charset="0"/>
+              </a:rPr>
+              <a:t> </a:t>
+            </a:r>
+            <a:r>
+              <a:rPr lang="en-US" sz="3600" dirty="0" err="1">
+                <a:solidFill>
+                  <a:schemeClr val="accent5">
+                    <a:lumMod val="50000"/>
+                  </a:schemeClr>
+                </a:solidFill>
+                <a:latin typeface="Times New Roman" panose="02020603050405020304" pitchFamily="18" charset="0"/>
+                <a:cs typeface="Times New Roman" panose="02020603050405020304" pitchFamily="18" charset="0"/>
+              </a:rPr>
+              <a:t>editar</a:t>
+            </a:r>
+            <a:r>
+              <a:rPr lang="en-US" sz="3600" dirty="0">
+                <a:solidFill>
+                  <a:schemeClr val="accent5">
+                    <a:lumMod val="50000"/>
+                  </a:schemeClr>
+                </a:solidFill>
+                <a:latin typeface="Times New Roman" panose="02020603050405020304" pitchFamily="18" charset="0"/>
+                <a:cs typeface="Times New Roman" panose="02020603050405020304" pitchFamily="18" charset="0"/>
+              </a:rPr>
+              <a:t> </a:t>
+            </a:r>
+            <a:r>
+              <a:rPr lang="en-US" sz="3600" dirty="0" err="1">
+                <a:solidFill>
+                  <a:schemeClr val="accent5">
+                    <a:lumMod val="50000"/>
+                  </a:schemeClr>
+                </a:solidFill>
+                <a:latin typeface="Times New Roman" panose="02020603050405020304" pitchFamily="18" charset="0"/>
+                <a:cs typeface="Times New Roman" panose="02020603050405020304" pitchFamily="18" charset="0"/>
+              </a:rPr>
+              <a:t>cuando</a:t>
+            </a:r>
+            <a:r>
+              <a:rPr lang="en-US" sz="3600" dirty="0">
+                <a:solidFill>
+                  <a:schemeClr val="accent5">
+                    <a:lumMod val="50000"/>
+                  </a:schemeClr>
+                </a:solidFill>
+                <a:latin typeface="Times New Roman" panose="02020603050405020304" pitchFamily="18" charset="0"/>
+                <a:cs typeface="Times New Roman" panose="02020603050405020304" pitchFamily="18" charset="0"/>
+              </a:rPr>
+              <a:t> </a:t>
+            </a:r>
+            <a:r>
+              <a:rPr lang="en-US" sz="3600" dirty="0" err="1">
+                <a:solidFill>
+                  <a:schemeClr val="accent5">
+                    <a:lumMod val="50000"/>
+                  </a:schemeClr>
+                </a:solidFill>
+                <a:latin typeface="Times New Roman" panose="02020603050405020304" pitchFamily="18" charset="0"/>
+                <a:cs typeface="Times New Roman" panose="02020603050405020304" pitchFamily="18" charset="0"/>
+              </a:rPr>
+              <a:t>necesite</a:t>
+            </a:r>
+            <a:endParaRPr lang="es-CO" sz="3600" dirty="0">
               <a:solidFill>
                 <a:schemeClr val="accent5">
                   <a:lumMod val="50000"/>
@@ -18909,96 +20080,6 @@
           </a:p>
         </p:txBody>
       </p:sp>
-      <p:pic>
-        <p:nvPicPr>
-          <p:cNvPr id="40" name="Picture 39"/>
-          <p:cNvPicPr>
-            <a:picLocks noChangeAspect="1"/>
-          </p:cNvPicPr>
-          <p:nvPr/>
-        </p:nvPicPr>
-        <p:blipFill>
-          <a:blip r:embed="rId13" cstate="print">
-            <a:extLst>
-              <a:ext uri="{28A0092B-C50C-407E-A947-70E740481C1C}">
-                <a14:useLocalDpi xmlns:a14="http://schemas.microsoft.com/office/drawing/2010/main" val="0"/>
-              </a:ext>
-            </a:extLst>
-          </a:blip>
-          <a:stretch>
-            <a:fillRect/>
-          </a:stretch>
-        </p:blipFill>
-        <p:spPr>
-          <a:xfrm>
-            <a:off x="16375502" y="28233652"/>
-            <a:ext cx="8175930" cy="4963957"/>
-          </a:xfrm>
-          <a:prstGeom prst="rect">
-            <a:avLst/>
-          </a:prstGeom>
-        </p:spPr>
-      </p:pic>
-      <p:pic>
-        <p:nvPicPr>
-          <p:cNvPr id="42" name="Picture 41"/>
-          <p:cNvPicPr>
-            <a:picLocks noChangeAspect="1"/>
-          </p:cNvPicPr>
-          <p:nvPr/>
-        </p:nvPicPr>
-        <p:blipFill>
-          <a:blip r:embed="rId14" cstate="print">
-            <a:extLst>
-              <a:ext uri="{28A0092B-C50C-407E-A947-70E740481C1C}">
-                <a14:useLocalDpi xmlns:a14="http://schemas.microsoft.com/office/drawing/2010/main" val="0"/>
-              </a:ext>
-            </a:extLst>
-          </a:blip>
-          <a:stretch>
-            <a:fillRect/>
-          </a:stretch>
-        </p:blipFill>
-        <p:spPr>
-          <a:xfrm>
-            <a:off x="16215692" y="33472072"/>
-            <a:ext cx="8314635" cy="5048171"/>
-          </a:xfrm>
-          <a:prstGeom prst="rect">
-            <a:avLst/>
-          </a:prstGeom>
-        </p:spPr>
-      </p:pic>
-      <p:pic>
-        <p:nvPicPr>
-          <p:cNvPr id="43" name="Picture 42"/>
-          <p:cNvPicPr>
-            <a:picLocks noChangeAspect="1"/>
-          </p:cNvPicPr>
-          <p:nvPr/>
-        </p:nvPicPr>
-        <p:blipFill>
-          <a:blip r:embed="rId15" cstate="print">
-            <a:extLst>
-              <a:ext uri="{28A0092B-C50C-407E-A947-70E740481C1C}">
-                <a14:useLocalDpi xmlns:a14="http://schemas.microsoft.com/office/drawing/2010/main" val="0"/>
-              </a:ext>
-            </a:extLst>
-          </a:blip>
-          <a:stretch>
-            <a:fillRect/>
-          </a:stretch>
-        </p:blipFill>
-        <p:spPr>
-          <a:xfrm>
-            <a:off x="20885435" y="12034799"/>
-            <a:ext cx="7934654" cy="4817468"/>
-          </a:xfrm>
-          <a:prstGeom prst="rect">
-            <a:avLst/>
-          </a:prstGeom>
-        </p:spPr>
-      </p:pic>
       <p:sp>
         <p:nvSpPr>
           <p:cNvPr id="70" name="TextBox 69"/>
@@ -19046,6 +20127,186 @@
           </a:p>
         </p:txBody>
       </p:sp>
+      <p:pic>
+        <p:nvPicPr>
+          <p:cNvPr id="5" name="Picture 4">
+            <a:extLst>
+              <a:ext uri="{FF2B5EF4-FFF2-40B4-BE49-F238E27FC236}">
+                <a16:creationId xmlns:a16="http://schemas.microsoft.com/office/drawing/2014/main" id="{1C50577C-53F7-4260-BD2E-B3821296289F}"/>
+              </a:ext>
+            </a:extLst>
+          </p:cNvPr>
+          <p:cNvPicPr>
+            <a:picLocks noChangeAspect="1"/>
+          </p:cNvPicPr>
+          <p:nvPr/>
+        </p:nvPicPr>
+        <p:blipFill>
+          <a:blip r:embed="rId3"/>
+          <a:stretch>
+            <a:fillRect/>
+          </a:stretch>
+        </p:blipFill>
+        <p:spPr>
+          <a:xfrm>
+            <a:off x="15803082" y="19479450"/>
+            <a:ext cx="6397650" cy="10935622"/>
+          </a:xfrm>
+          <a:prstGeom prst="rect">
+            <a:avLst/>
+          </a:prstGeom>
+        </p:spPr>
+      </p:pic>
+      <p:pic>
+        <p:nvPicPr>
+          <p:cNvPr id="6" name="Picture 5">
+            <a:extLst>
+              <a:ext uri="{FF2B5EF4-FFF2-40B4-BE49-F238E27FC236}">
+                <a16:creationId xmlns:a16="http://schemas.microsoft.com/office/drawing/2014/main" id="{D8FF8CAB-F194-4BD9-8AC2-B214F0E63B0B}"/>
+              </a:ext>
+            </a:extLst>
+          </p:cNvPr>
+          <p:cNvPicPr>
+            <a:picLocks noChangeAspect="1"/>
+          </p:cNvPicPr>
+          <p:nvPr/>
+        </p:nvPicPr>
+        <p:blipFill>
+          <a:blip r:embed="rId4"/>
+          <a:stretch>
+            <a:fillRect/>
+          </a:stretch>
+        </p:blipFill>
+        <p:spPr>
+          <a:xfrm>
+            <a:off x="22726963" y="19479450"/>
+            <a:ext cx="6771031" cy="11616270"/>
+          </a:xfrm>
+          <a:prstGeom prst="rect">
+            <a:avLst/>
+          </a:prstGeom>
+        </p:spPr>
+      </p:pic>
+      <p:pic>
+        <p:nvPicPr>
+          <p:cNvPr id="7" name="Picture 6">
+            <a:extLst>
+              <a:ext uri="{FF2B5EF4-FFF2-40B4-BE49-F238E27FC236}">
+                <a16:creationId xmlns:a16="http://schemas.microsoft.com/office/drawing/2014/main" id="{9A28CABC-94F2-4627-BB6D-499F9BC2CBD2}"/>
+              </a:ext>
+            </a:extLst>
+          </p:cNvPr>
+          <p:cNvPicPr>
+            <a:picLocks noChangeAspect="1"/>
+          </p:cNvPicPr>
+          <p:nvPr/>
+        </p:nvPicPr>
+        <p:blipFill>
+          <a:blip r:embed="rId5"/>
+          <a:stretch>
+            <a:fillRect/>
+          </a:stretch>
+        </p:blipFill>
+        <p:spPr>
+          <a:xfrm>
+            <a:off x="21615125" y="7538739"/>
+            <a:ext cx="6129694" cy="10491617"/>
+          </a:xfrm>
+          <a:prstGeom prst="rect">
+            <a:avLst/>
+          </a:prstGeom>
+        </p:spPr>
+      </p:pic>
+      <p:pic>
+        <p:nvPicPr>
+          <p:cNvPr id="8" name="Picture 7">
+            <a:extLst>
+              <a:ext uri="{FF2B5EF4-FFF2-40B4-BE49-F238E27FC236}">
+                <a16:creationId xmlns:a16="http://schemas.microsoft.com/office/drawing/2014/main" id="{2C272CBE-A879-4EA6-8069-60FC4BF8CEC8}"/>
+              </a:ext>
+            </a:extLst>
+          </p:cNvPr>
+          <p:cNvPicPr>
+            <a:picLocks noChangeAspect="1"/>
+          </p:cNvPicPr>
+          <p:nvPr/>
+        </p:nvPicPr>
+        <p:blipFill>
+          <a:blip r:embed="rId6"/>
+          <a:stretch>
+            <a:fillRect/>
+          </a:stretch>
+        </p:blipFill>
+        <p:spPr>
+          <a:xfrm>
+            <a:off x="7655488" y="34300729"/>
+            <a:ext cx="4319282" cy="7392906"/>
+          </a:xfrm>
+          <a:prstGeom prst="rect">
+            <a:avLst/>
+          </a:prstGeom>
+        </p:spPr>
+      </p:pic>
+      <p:pic>
+        <p:nvPicPr>
+          <p:cNvPr id="9" name="Picture 8">
+            <a:extLst>
+              <a:ext uri="{FF2B5EF4-FFF2-40B4-BE49-F238E27FC236}">
+                <a16:creationId xmlns:a16="http://schemas.microsoft.com/office/drawing/2014/main" id="{3494AF26-73A0-492E-A660-C452134C1C27}"/>
+              </a:ext>
+            </a:extLst>
+          </p:cNvPr>
+          <p:cNvPicPr>
+            <a:picLocks noChangeAspect="1"/>
+          </p:cNvPicPr>
+          <p:nvPr/>
+        </p:nvPicPr>
+        <p:blipFill>
+          <a:blip r:embed="rId7"/>
+          <a:stretch>
+            <a:fillRect/>
+          </a:stretch>
+        </p:blipFill>
+        <p:spPr>
+          <a:xfrm>
+            <a:off x="2005264" y="24270335"/>
+            <a:ext cx="4309265" cy="7392904"/>
+          </a:xfrm>
+          <a:prstGeom prst="rect">
+            <a:avLst/>
+          </a:prstGeom>
+        </p:spPr>
+      </p:pic>
+      <p:pic>
+        <p:nvPicPr>
+          <p:cNvPr id="10" name="Picture 9">
+            <a:extLst>
+              <a:ext uri="{FF2B5EF4-FFF2-40B4-BE49-F238E27FC236}">
+                <a16:creationId xmlns:a16="http://schemas.microsoft.com/office/drawing/2014/main" id="{D984D623-24BD-4E29-98C1-83A3EF87A2DB}"/>
+              </a:ext>
+            </a:extLst>
+          </p:cNvPr>
+          <p:cNvPicPr>
+            <a:picLocks noChangeAspect="1"/>
+          </p:cNvPicPr>
+          <p:nvPr/>
+        </p:nvPicPr>
+        <p:blipFill>
+          <a:blip r:embed="rId8"/>
+          <a:stretch>
+            <a:fillRect/>
+          </a:stretch>
+        </p:blipFill>
+        <p:spPr>
+          <a:xfrm>
+            <a:off x="7655488" y="24270335"/>
+            <a:ext cx="4319281" cy="7392904"/>
+          </a:xfrm>
+          <a:prstGeom prst="rect">
+            <a:avLst/>
+          </a:prstGeom>
+        </p:spPr>
+      </p:pic>
     </p:spTree>
     <p:extLst>
       <p:ext uri="{BB962C8B-B14F-4D97-AF65-F5344CB8AC3E}">

</xml_diff>